<commit_message>
Updated example arch diagrams per Q2 .pptx toolkit
</commit_message>
<xml_diff>
--- a/doc/serverless-architecture-examples/snowflake-sagemaker-autopilot-architecture-diagram.pptx
+++ b/doc/serverless-architecture-examples/snowflake-sagemaker-autopilot-architecture-diagram.pptx
@@ -243,7 +243,7 @@
           <a:p>
             <a:fld id="{91C60245-26E3-4FD7-ADFD-EF14CF1A38F3}" type="datetimeFigureOut">
               <a:rPr lang="en-US" smtClean="0"/>
-              <a:t>8/5/2022</a:t>
+              <a:t>4/17/2023</a:t>
             </a:fld>
             <a:endParaRPr lang="en-US" dirty="0"/>
           </a:p>
@@ -413,7 +413,7 @@
           <a:p>
             <a:fld id="{91C60245-26E3-4FD7-ADFD-EF14CF1A38F3}" type="datetimeFigureOut">
               <a:rPr lang="en-US" smtClean="0"/>
-              <a:t>8/5/2022</a:t>
+              <a:t>4/17/2023</a:t>
             </a:fld>
             <a:endParaRPr lang="en-US" dirty="0"/>
           </a:p>
@@ -593,7 +593,7 @@
           <a:p>
             <a:fld id="{91C60245-26E3-4FD7-ADFD-EF14CF1A38F3}" type="datetimeFigureOut">
               <a:rPr lang="en-US" smtClean="0"/>
-              <a:t>8/5/2022</a:t>
+              <a:t>4/17/2023</a:t>
             </a:fld>
             <a:endParaRPr lang="en-US" dirty="0"/>
           </a:p>
@@ -763,7 +763,7 @@
           <a:p>
             <a:fld id="{91C60245-26E3-4FD7-ADFD-EF14CF1A38F3}" type="datetimeFigureOut">
               <a:rPr lang="en-US" smtClean="0"/>
-              <a:t>8/5/2022</a:t>
+              <a:t>4/17/2023</a:t>
             </a:fld>
             <a:endParaRPr lang="en-US" dirty="0"/>
           </a:p>
@@ -1007,7 +1007,7 @@
           <a:p>
             <a:fld id="{91C60245-26E3-4FD7-ADFD-EF14CF1A38F3}" type="datetimeFigureOut">
               <a:rPr lang="en-US" smtClean="0"/>
-              <a:t>8/5/2022</a:t>
+              <a:t>4/17/2023</a:t>
             </a:fld>
             <a:endParaRPr lang="en-US" dirty="0"/>
           </a:p>
@@ -1239,7 +1239,7 @@
           <a:p>
             <a:fld id="{91C60245-26E3-4FD7-ADFD-EF14CF1A38F3}" type="datetimeFigureOut">
               <a:rPr lang="en-US" smtClean="0"/>
-              <a:t>8/5/2022</a:t>
+              <a:t>4/17/2023</a:t>
             </a:fld>
             <a:endParaRPr lang="en-US" dirty="0"/>
           </a:p>
@@ -1606,7 +1606,7 @@
           <a:p>
             <a:fld id="{91C60245-26E3-4FD7-ADFD-EF14CF1A38F3}" type="datetimeFigureOut">
               <a:rPr lang="en-US" smtClean="0"/>
-              <a:t>8/5/2022</a:t>
+              <a:t>4/17/2023</a:t>
             </a:fld>
             <a:endParaRPr lang="en-US" dirty="0"/>
           </a:p>
@@ -1724,7 +1724,7 @@
           <a:p>
             <a:fld id="{91C60245-26E3-4FD7-ADFD-EF14CF1A38F3}" type="datetimeFigureOut">
               <a:rPr lang="en-US" smtClean="0"/>
-              <a:t>8/5/2022</a:t>
+              <a:t>4/17/2023</a:t>
             </a:fld>
             <a:endParaRPr lang="en-US" dirty="0"/>
           </a:p>
@@ -1819,7 +1819,7 @@
           <a:p>
             <a:fld id="{91C60245-26E3-4FD7-ADFD-EF14CF1A38F3}" type="datetimeFigureOut">
               <a:rPr lang="en-US" smtClean="0"/>
-              <a:t>8/5/2022</a:t>
+              <a:t>4/17/2023</a:t>
             </a:fld>
             <a:endParaRPr lang="en-US" dirty="0"/>
           </a:p>
@@ -2096,7 +2096,7 @@
           <a:p>
             <a:fld id="{91C60245-26E3-4FD7-ADFD-EF14CF1A38F3}" type="datetimeFigureOut">
               <a:rPr lang="en-US" smtClean="0"/>
-              <a:t>8/5/2022</a:t>
+              <a:t>4/17/2023</a:t>
             </a:fld>
             <a:endParaRPr lang="en-US" dirty="0"/>
           </a:p>
@@ -2352,7 +2352,7 @@
           <a:p>
             <a:fld id="{91C60245-26E3-4FD7-ADFD-EF14CF1A38F3}" type="datetimeFigureOut">
               <a:rPr lang="en-US" smtClean="0"/>
-              <a:t>8/5/2022</a:t>
+              <a:t>4/17/2023</a:t>
             </a:fld>
             <a:endParaRPr lang="en-US" dirty="0"/>
           </a:p>
@@ -2565,7 +2565,7 @@
           <a:p>
             <a:fld id="{91C60245-26E3-4FD7-ADFD-EF14CF1A38F3}" type="datetimeFigureOut">
               <a:rPr lang="en-US" smtClean="0"/>
-              <a:t>8/5/2022</a:t>
+              <a:t>4/17/2023</a:t>
             </a:fld>
             <a:endParaRPr lang="en-US" dirty="0"/>
           </a:p>
@@ -2984,7 +2984,7 @@
         </p:nvSpPr>
         <p:spPr>
           <a:xfrm>
-            <a:off x="6126480" y="5120640"/>
+            <a:off x="7805990" y="5008672"/>
             <a:ext cx="209298" cy="207814"/>
           </a:xfrm>
           <a:custGeom>
@@ -3505,1222 +3505,6 @@
           </a:p>
         </p:txBody>
       </p:sp>
-      <p:grpSp>
-        <p:nvGrpSpPr>
-          <p:cNvPr id="7" name="Google Shape;563;gd93e1c5cec_0_402">
-            <a:extLst>
-              <a:ext uri="{FF2B5EF4-FFF2-40B4-BE49-F238E27FC236}">
-                <a16:creationId xmlns:a16="http://schemas.microsoft.com/office/drawing/2014/main" id="{5B50FE1A-E28B-42E5-9284-C5BEAB422556}"/>
-              </a:ext>
-            </a:extLst>
-          </p:cNvPr>
-          <p:cNvGrpSpPr/>
-          <p:nvPr/>
-        </p:nvGrpSpPr>
-        <p:grpSpPr>
-          <a:xfrm>
-            <a:off x="6797040" y="5598161"/>
-            <a:ext cx="237492" cy="312773"/>
-            <a:chOff x="4930669" y="-189771"/>
-            <a:chExt cx="222412" cy="292886"/>
-          </a:xfrm>
-        </p:grpSpPr>
-        <p:sp>
-          <p:nvSpPr>
-            <p:cNvPr id="8" name="Google Shape;564;gd93e1c5cec_0_402">
-              <a:extLst>
-                <a:ext uri="{FF2B5EF4-FFF2-40B4-BE49-F238E27FC236}">
-                  <a16:creationId xmlns:a16="http://schemas.microsoft.com/office/drawing/2014/main" id="{60CC6031-156A-49D2-ADC1-F55AC677EA64}"/>
-                </a:ext>
-              </a:extLst>
-            </p:cNvPr>
-            <p:cNvSpPr/>
-            <p:nvPr/>
-          </p:nvSpPr>
-          <p:spPr>
-            <a:xfrm>
-              <a:off x="4968723" y="-67297"/>
-              <a:ext cx="145287" cy="14778"/>
-            </a:xfrm>
-            <a:custGeom>
-              <a:avLst/>
-              <a:gdLst/>
-              <a:ahLst/>
-              <a:cxnLst/>
-              <a:rect l="l" t="t" r="r" b="b"/>
-              <a:pathLst>
-                <a:path w="145287" h="14778" extrusionOk="0">
-                  <a:moveTo>
-                    <a:pt x="0" y="7389"/>
-                  </a:moveTo>
-                  <a:cubicBezTo>
-                    <a:pt x="0" y="11470"/>
-                    <a:pt x="3308" y="14778"/>
-                    <a:pt x="7389" y="14778"/>
-                  </a:cubicBezTo>
-                  <a:lnTo>
-                    <a:pt x="137899" y="14778"/>
-                  </a:lnTo>
-                  <a:cubicBezTo>
-                    <a:pt x="141980" y="14778"/>
-                    <a:pt x="145288" y="11470"/>
-                    <a:pt x="145288" y="7389"/>
-                  </a:cubicBezTo>
-                  <a:cubicBezTo>
-                    <a:pt x="145288" y="3308"/>
-                    <a:pt x="141980" y="0"/>
-                    <a:pt x="137899" y="0"/>
-                  </a:cubicBezTo>
-                  <a:lnTo>
-                    <a:pt x="7389" y="0"/>
-                  </a:lnTo>
-                  <a:cubicBezTo>
-                    <a:pt x="3308" y="0"/>
-                    <a:pt x="0" y="3308"/>
-                    <a:pt x="0" y="7389"/>
-                  </a:cubicBezTo>
-                  <a:close/>
-                </a:path>
-              </a:pathLst>
-            </a:custGeom>
-            <a:solidFill>
-              <a:srgbClr val="2AB5E8"/>
-            </a:solidFill>
-            <a:ln>
-              <a:noFill/>
-            </a:ln>
-          </p:spPr>
-          <p:txBody>
-            <a:bodyPr spcFirstLastPara="1" wrap="square" lIns="91425" tIns="45700" rIns="91425" bIns="45700" anchor="ctr" anchorCtr="0">
-              <a:noAutofit/>
-            </a:bodyPr>
-            <a:lstStyle/>
-            <a:p>
-              <a:pPr>
-                <a:buClr>
-                  <a:srgbClr val="000000"/>
-                </a:buClr>
-                <a:buSzPts val="1350"/>
-              </a:pPr>
-              <a:endParaRPr sz="1350" dirty="0">
-                <a:solidFill>
-                  <a:schemeClr val="dk1"/>
-                </a:solidFill>
-                <a:latin typeface="Arial"/>
-                <a:ea typeface="Arial"/>
-                <a:cs typeface="Arial"/>
-                <a:sym typeface="Arial"/>
-              </a:endParaRPr>
-            </a:p>
-          </p:txBody>
-        </p:sp>
-        <p:sp>
-          <p:nvSpPr>
-            <p:cNvPr id="9" name="Google Shape;565;gd93e1c5cec_0_402">
-              <a:extLst>
-                <a:ext uri="{FF2B5EF4-FFF2-40B4-BE49-F238E27FC236}">
-                  <a16:creationId xmlns:a16="http://schemas.microsoft.com/office/drawing/2014/main" id="{6880BF01-F069-4DE4-908F-DB2674DADE3B}"/>
-                </a:ext>
-              </a:extLst>
-            </p:cNvPr>
-            <p:cNvSpPr/>
-            <p:nvPr/>
-          </p:nvSpPr>
-          <p:spPr>
-            <a:xfrm>
-              <a:off x="4968723" y="-32106"/>
-              <a:ext cx="145287" cy="14778"/>
-            </a:xfrm>
-            <a:custGeom>
-              <a:avLst/>
-              <a:gdLst/>
-              <a:ahLst/>
-              <a:cxnLst/>
-              <a:rect l="l" t="t" r="r" b="b"/>
-              <a:pathLst>
-                <a:path w="145287" h="14778" extrusionOk="0">
-                  <a:moveTo>
-                    <a:pt x="137899" y="0"/>
-                  </a:moveTo>
-                  <a:lnTo>
-                    <a:pt x="7389" y="0"/>
-                  </a:lnTo>
-                  <a:cubicBezTo>
-                    <a:pt x="3308" y="0"/>
-                    <a:pt x="0" y="3308"/>
-                    <a:pt x="0" y="7389"/>
-                  </a:cubicBezTo>
-                  <a:cubicBezTo>
-                    <a:pt x="0" y="11470"/>
-                    <a:pt x="3308" y="14778"/>
-                    <a:pt x="7389" y="14778"/>
-                  </a:cubicBezTo>
-                  <a:lnTo>
-                    <a:pt x="137899" y="14778"/>
-                  </a:lnTo>
-                  <a:cubicBezTo>
-                    <a:pt x="141980" y="14778"/>
-                    <a:pt x="145288" y="11470"/>
-                    <a:pt x="145288" y="7389"/>
-                  </a:cubicBezTo>
-                  <a:cubicBezTo>
-                    <a:pt x="145288" y="3308"/>
-                    <a:pt x="141980" y="0"/>
-                    <a:pt x="137899" y="0"/>
-                  </a:cubicBezTo>
-                  <a:close/>
-                </a:path>
-              </a:pathLst>
-            </a:custGeom>
-            <a:solidFill>
-              <a:srgbClr val="2AB5E8"/>
-            </a:solidFill>
-            <a:ln>
-              <a:noFill/>
-            </a:ln>
-          </p:spPr>
-          <p:txBody>
-            <a:bodyPr spcFirstLastPara="1" wrap="square" lIns="91425" tIns="45700" rIns="91425" bIns="45700" anchor="ctr" anchorCtr="0">
-              <a:noAutofit/>
-            </a:bodyPr>
-            <a:lstStyle/>
-            <a:p>
-              <a:pPr>
-                <a:buClr>
-                  <a:srgbClr val="000000"/>
-                </a:buClr>
-                <a:buSzPts val="1350"/>
-              </a:pPr>
-              <a:endParaRPr sz="1350" dirty="0">
-                <a:solidFill>
-                  <a:schemeClr val="dk1"/>
-                </a:solidFill>
-                <a:latin typeface="Arial"/>
-                <a:ea typeface="Arial"/>
-                <a:cs typeface="Arial"/>
-                <a:sym typeface="Arial"/>
-              </a:endParaRPr>
-            </a:p>
-          </p:txBody>
-        </p:sp>
-        <p:sp>
-          <p:nvSpPr>
-            <p:cNvPr id="10" name="Google Shape;566;gd93e1c5cec_0_402">
-              <a:extLst>
-                <a:ext uri="{FF2B5EF4-FFF2-40B4-BE49-F238E27FC236}">
-                  <a16:creationId xmlns:a16="http://schemas.microsoft.com/office/drawing/2014/main" id="{B93D53EB-8C89-4CAE-AE01-D0BDE9901723}"/>
-                </a:ext>
-              </a:extLst>
-            </p:cNvPr>
-            <p:cNvSpPr/>
-            <p:nvPr/>
-          </p:nvSpPr>
-          <p:spPr>
-            <a:xfrm>
-              <a:off x="4968723" y="3083"/>
-              <a:ext cx="145287" cy="14778"/>
-            </a:xfrm>
-            <a:custGeom>
-              <a:avLst/>
-              <a:gdLst/>
-              <a:ahLst/>
-              <a:cxnLst/>
-              <a:rect l="l" t="t" r="r" b="b"/>
-              <a:pathLst>
-                <a:path w="145287" h="14778" extrusionOk="0">
-                  <a:moveTo>
-                    <a:pt x="137899" y="0"/>
-                  </a:moveTo>
-                  <a:lnTo>
-                    <a:pt x="7389" y="0"/>
-                  </a:lnTo>
-                  <a:cubicBezTo>
-                    <a:pt x="3308" y="0"/>
-                    <a:pt x="0" y="3308"/>
-                    <a:pt x="0" y="7389"/>
-                  </a:cubicBezTo>
-                  <a:cubicBezTo>
-                    <a:pt x="0" y="11470"/>
-                    <a:pt x="3308" y="14778"/>
-                    <a:pt x="7389" y="14778"/>
-                  </a:cubicBezTo>
-                  <a:lnTo>
-                    <a:pt x="137899" y="14778"/>
-                  </a:lnTo>
-                  <a:cubicBezTo>
-                    <a:pt x="141980" y="14778"/>
-                    <a:pt x="145288" y="11470"/>
-                    <a:pt x="145288" y="7389"/>
-                  </a:cubicBezTo>
-                  <a:cubicBezTo>
-                    <a:pt x="145288" y="3308"/>
-                    <a:pt x="141980" y="0"/>
-                    <a:pt x="137899" y="0"/>
-                  </a:cubicBezTo>
-                  <a:close/>
-                </a:path>
-              </a:pathLst>
-            </a:custGeom>
-            <a:solidFill>
-              <a:srgbClr val="2AB5E8"/>
-            </a:solidFill>
-            <a:ln>
-              <a:noFill/>
-            </a:ln>
-          </p:spPr>
-          <p:txBody>
-            <a:bodyPr spcFirstLastPara="1" wrap="square" lIns="91425" tIns="45700" rIns="91425" bIns="45700" anchor="ctr" anchorCtr="0">
-              <a:noAutofit/>
-            </a:bodyPr>
-            <a:lstStyle/>
-            <a:p>
-              <a:pPr>
-                <a:buClr>
-                  <a:srgbClr val="000000"/>
-                </a:buClr>
-                <a:buSzPts val="1350"/>
-              </a:pPr>
-              <a:endParaRPr sz="1350" dirty="0">
-                <a:solidFill>
-                  <a:schemeClr val="dk1"/>
-                </a:solidFill>
-                <a:latin typeface="Arial"/>
-                <a:ea typeface="Arial"/>
-                <a:cs typeface="Arial"/>
-                <a:sym typeface="Arial"/>
-              </a:endParaRPr>
-            </a:p>
-          </p:txBody>
-        </p:sp>
-        <p:sp>
-          <p:nvSpPr>
-            <p:cNvPr id="11" name="Google Shape;567;gd93e1c5cec_0_402">
-              <a:extLst>
-                <a:ext uri="{FF2B5EF4-FFF2-40B4-BE49-F238E27FC236}">
-                  <a16:creationId xmlns:a16="http://schemas.microsoft.com/office/drawing/2014/main" id="{BA1F3E50-6D48-42CC-AC6B-0EDA3D29B40A}"/>
-                </a:ext>
-              </a:extLst>
-            </p:cNvPr>
-            <p:cNvSpPr/>
-            <p:nvPr/>
-          </p:nvSpPr>
-          <p:spPr>
-            <a:xfrm>
-              <a:off x="4968723" y="38274"/>
-              <a:ext cx="145287" cy="14778"/>
-            </a:xfrm>
-            <a:custGeom>
-              <a:avLst/>
-              <a:gdLst/>
-              <a:ahLst/>
-              <a:cxnLst/>
-              <a:rect l="l" t="t" r="r" b="b"/>
-              <a:pathLst>
-                <a:path w="145287" h="14778" extrusionOk="0">
-                  <a:moveTo>
-                    <a:pt x="137899" y="0"/>
-                  </a:moveTo>
-                  <a:lnTo>
-                    <a:pt x="7389" y="0"/>
-                  </a:lnTo>
-                  <a:cubicBezTo>
-                    <a:pt x="3308" y="0"/>
-                    <a:pt x="0" y="3308"/>
-                    <a:pt x="0" y="7389"/>
-                  </a:cubicBezTo>
-                  <a:cubicBezTo>
-                    <a:pt x="0" y="11470"/>
-                    <a:pt x="3308" y="14778"/>
-                    <a:pt x="7389" y="14778"/>
-                  </a:cubicBezTo>
-                  <a:lnTo>
-                    <a:pt x="137899" y="14778"/>
-                  </a:lnTo>
-                  <a:cubicBezTo>
-                    <a:pt x="141980" y="14778"/>
-                    <a:pt x="145288" y="11470"/>
-                    <a:pt x="145288" y="7389"/>
-                  </a:cubicBezTo>
-                  <a:cubicBezTo>
-                    <a:pt x="145288" y="3308"/>
-                    <a:pt x="141980" y="0"/>
-                    <a:pt x="137899" y="0"/>
-                  </a:cubicBezTo>
-                  <a:close/>
-                </a:path>
-              </a:pathLst>
-            </a:custGeom>
-            <a:solidFill>
-              <a:srgbClr val="2AB5E8"/>
-            </a:solidFill>
-            <a:ln>
-              <a:noFill/>
-            </a:ln>
-          </p:spPr>
-          <p:txBody>
-            <a:bodyPr spcFirstLastPara="1" wrap="square" lIns="91425" tIns="45700" rIns="91425" bIns="45700" anchor="ctr" anchorCtr="0">
-              <a:noAutofit/>
-            </a:bodyPr>
-            <a:lstStyle/>
-            <a:p>
-              <a:pPr>
-                <a:buClr>
-                  <a:srgbClr val="000000"/>
-                </a:buClr>
-                <a:buSzPts val="1350"/>
-              </a:pPr>
-              <a:endParaRPr sz="1350" dirty="0">
-                <a:solidFill>
-                  <a:schemeClr val="dk1"/>
-                </a:solidFill>
-                <a:latin typeface="Arial"/>
-                <a:ea typeface="Arial"/>
-                <a:cs typeface="Arial"/>
-                <a:sym typeface="Arial"/>
-              </a:endParaRPr>
-            </a:p>
-          </p:txBody>
-        </p:sp>
-        <p:sp>
-          <p:nvSpPr>
-            <p:cNvPr id="12" name="Google Shape;568;gd93e1c5cec_0_402">
-              <a:extLst>
-                <a:ext uri="{FF2B5EF4-FFF2-40B4-BE49-F238E27FC236}">
-                  <a16:creationId xmlns:a16="http://schemas.microsoft.com/office/drawing/2014/main" id="{72E6B895-894E-477E-9B16-9537B2F8393E}"/>
-                </a:ext>
-              </a:extLst>
-            </p:cNvPr>
-            <p:cNvSpPr/>
-            <p:nvPr/>
-          </p:nvSpPr>
-          <p:spPr>
-            <a:xfrm>
-              <a:off x="4930669" y="-189771"/>
-              <a:ext cx="222412" cy="292886"/>
-            </a:xfrm>
-            <a:custGeom>
-              <a:avLst/>
-              <a:gdLst/>
-              <a:ahLst/>
-              <a:cxnLst/>
-              <a:rect l="l" t="t" r="r" b="b"/>
-              <a:pathLst>
-                <a:path w="222412" h="292886" extrusionOk="0">
-                  <a:moveTo>
-                    <a:pt x="210867" y="0"/>
-                  </a:moveTo>
-                  <a:lnTo>
-                    <a:pt x="66872" y="0"/>
-                  </a:lnTo>
-                  <a:cubicBezTo>
-                    <a:pt x="63487" y="-19"/>
-                    <a:pt x="60270" y="1470"/>
-                    <a:pt x="58097" y="4064"/>
-                  </a:cubicBezTo>
-                  <a:lnTo>
-                    <a:pt x="2679" y="69550"/>
-                  </a:lnTo>
-                  <a:cubicBezTo>
-                    <a:pt x="935" y="71616"/>
-                    <a:pt x="-14" y="74236"/>
-                    <a:pt x="0" y="76939"/>
-                  </a:cubicBezTo>
-                  <a:lnTo>
-                    <a:pt x="0" y="281340"/>
-                  </a:lnTo>
-                  <a:cubicBezTo>
-                    <a:pt x="-51" y="287665"/>
-                    <a:pt x="5035" y="292835"/>
-                    <a:pt x="11360" y="292885"/>
-                  </a:cubicBezTo>
-                  <a:cubicBezTo>
-                    <a:pt x="11422" y="292886"/>
-                    <a:pt x="11484" y="292886"/>
-                    <a:pt x="11546" y="292885"/>
-                  </a:cubicBezTo>
-                  <a:lnTo>
-                    <a:pt x="210867" y="292885"/>
-                  </a:lnTo>
-                  <a:cubicBezTo>
-                    <a:pt x="217192" y="292936"/>
-                    <a:pt x="222361" y="287851"/>
-                    <a:pt x="222412" y="281526"/>
-                  </a:cubicBezTo>
-                  <a:cubicBezTo>
-                    <a:pt x="222413" y="281464"/>
-                    <a:pt x="222413" y="281402"/>
-                    <a:pt x="222412" y="281340"/>
-                  </a:cubicBezTo>
-                  <a:lnTo>
-                    <a:pt x="222412" y="11546"/>
-                  </a:lnTo>
-                  <a:cubicBezTo>
-                    <a:pt x="222463" y="5221"/>
-                    <a:pt x="217377" y="52"/>
-                    <a:pt x="211052" y="0"/>
-                  </a:cubicBezTo>
-                  <a:cubicBezTo>
-                    <a:pt x="210990" y="0"/>
-                    <a:pt x="210928" y="0"/>
-                    <a:pt x="210867" y="0"/>
-                  </a:cubicBezTo>
-                  <a:close/>
-                  <a:moveTo>
-                    <a:pt x="58651" y="39163"/>
-                  </a:moveTo>
-                  <a:lnTo>
-                    <a:pt x="58651" y="70381"/>
-                  </a:lnTo>
-                  <a:lnTo>
-                    <a:pt x="32697" y="70381"/>
-                  </a:lnTo>
-                  <a:close/>
-                  <a:moveTo>
-                    <a:pt x="198952" y="269795"/>
-                  </a:moveTo>
-                  <a:lnTo>
-                    <a:pt x="23461" y="269795"/>
-                  </a:lnTo>
-                  <a:lnTo>
-                    <a:pt x="23461" y="93472"/>
-                  </a:lnTo>
-                  <a:lnTo>
-                    <a:pt x="70566" y="93472"/>
-                  </a:lnTo>
-                  <a:cubicBezTo>
-                    <a:pt x="76943" y="93472"/>
-                    <a:pt x="82112" y="88304"/>
-                    <a:pt x="82112" y="81927"/>
-                  </a:cubicBezTo>
-                  <a:lnTo>
-                    <a:pt x="82112" y="23091"/>
-                  </a:lnTo>
-                  <a:lnTo>
-                    <a:pt x="198952" y="23091"/>
-                  </a:lnTo>
-                  <a:close/>
-                </a:path>
-              </a:pathLst>
-            </a:custGeom>
-            <a:solidFill>
-              <a:srgbClr val="2AB5E8"/>
-            </a:solidFill>
-            <a:ln>
-              <a:noFill/>
-            </a:ln>
-          </p:spPr>
-          <p:txBody>
-            <a:bodyPr spcFirstLastPara="1" wrap="square" lIns="91425" tIns="45700" rIns="91425" bIns="45700" anchor="ctr" anchorCtr="0">
-              <a:noAutofit/>
-            </a:bodyPr>
-            <a:lstStyle/>
-            <a:p>
-              <a:pPr>
-                <a:buClr>
-                  <a:srgbClr val="000000"/>
-                </a:buClr>
-                <a:buSzPts val="1350"/>
-              </a:pPr>
-              <a:endParaRPr sz="1350" dirty="0">
-                <a:solidFill>
-                  <a:schemeClr val="dk1"/>
-                </a:solidFill>
-                <a:latin typeface="Arial"/>
-                <a:ea typeface="Arial"/>
-                <a:cs typeface="Arial"/>
-                <a:sym typeface="Arial"/>
-              </a:endParaRPr>
-            </a:p>
-          </p:txBody>
-        </p:sp>
-      </p:grpSp>
-      <p:grpSp>
-        <p:nvGrpSpPr>
-          <p:cNvPr id="13" name="Google Shape;569;gd93e1c5cec_0_402">
-            <a:extLst>
-              <a:ext uri="{FF2B5EF4-FFF2-40B4-BE49-F238E27FC236}">
-                <a16:creationId xmlns:a16="http://schemas.microsoft.com/office/drawing/2014/main" id="{A138D0F8-0C30-4EF0-A7F7-99E44873D961}"/>
-              </a:ext>
-            </a:extLst>
-          </p:cNvPr>
-          <p:cNvGrpSpPr/>
-          <p:nvPr/>
-        </p:nvGrpSpPr>
-        <p:grpSpPr>
-          <a:xfrm>
-            <a:off x="6797040" y="7106921"/>
-            <a:ext cx="237492" cy="312773"/>
-            <a:chOff x="4930669" y="-189771"/>
-            <a:chExt cx="222412" cy="292886"/>
-          </a:xfrm>
-        </p:grpSpPr>
-        <p:sp>
-          <p:nvSpPr>
-            <p:cNvPr id="14" name="Google Shape;570;gd93e1c5cec_0_402">
-              <a:extLst>
-                <a:ext uri="{FF2B5EF4-FFF2-40B4-BE49-F238E27FC236}">
-                  <a16:creationId xmlns:a16="http://schemas.microsoft.com/office/drawing/2014/main" id="{B74A23A6-2599-4B64-9547-CA94CE97E573}"/>
-                </a:ext>
-              </a:extLst>
-            </p:cNvPr>
-            <p:cNvSpPr/>
-            <p:nvPr/>
-          </p:nvSpPr>
-          <p:spPr>
-            <a:xfrm>
-              <a:off x="4968723" y="-67297"/>
-              <a:ext cx="145287" cy="14778"/>
-            </a:xfrm>
-            <a:custGeom>
-              <a:avLst/>
-              <a:gdLst/>
-              <a:ahLst/>
-              <a:cxnLst/>
-              <a:rect l="l" t="t" r="r" b="b"/>
-              <a:pathLst>
-                <a:path w="145287" h="14778" extrusionOk="0">
-                  <a:moveTo>
-                    <a:pt x="0" y="7389"/>
-                  </a:moveTo>
-                  <a:cubicBezTo>
-                    <a:pt x="0" y="11470"/>
-                    <a:pt x="3308" y="14778"/>
-                    <a:pt x="7389" y="14778"/>
-                  </a:cubicBezTo>
-                  <a:lnTo>
-                    <a:pt x="137899" y="14778"/>
-                  </a:lnTo>
-                  <a:cubicBezTo>
-                    <a:pt x="141980" y="14778"/>
-                    <a:pt x="145288" y="11470"/>
-                    <a:pt x="145288" y="7389"/>
-                  </a:cubicBezTo>
-                  <a:cubicBezTo>
-                    <a:pt x="145288" y="3308"/>
-                    <a:pt x="141980" y="0"/>
-                    <a:pt x="137899" y="0"/>
-                  </a:cubicBezTo>
-                  <a:lnTo>
-                    <a:pt x="7389" y="0"/>
-                  </a:lnTo>
-                  <a:cubicBezTo>
-                    <a:pt x="3308" y="0"/>
-                    <a:pt x="0" y="3308"/>
-                    <a:pt x="0" y="7389"/>
-                  </a:cubicBezTo>
-                  <a:close/>
-                </a:path>
-              </a:pathLst>
-            </a:custGeom>
-            <a:solidFill>
-              <a:srgbClr val="2AB5E8"/>
-            </a:solidFill>
-            <a:ln>
-              <a:noFill/>
-            </a:ln>
-          </p:spPr>
-          <p:txBody>
-            <a:bodyPr spcFirstLastPara="1" wrap="square" lIns="91425" tIns="45700" rIns="91425" bIns="45700" anchor="ctr" anchorCtr="0">
-              <a:noAutofit/>
-            </a:bodyPr>
-            <a:lstStyle/>
-            <a:p>
-              <a:pPr>
-                <a:buClr>
-                  <a:srgbClr val="000000"/>
-                </a:buClr>
-                <a:buSzPts val="1350"/>
-              </a:pPr>
-              <a:endParaRPr sz="1350" dirty="0">
-                <a:solidFill>
-                  <a:schemeClr val="dk1"/>
-                </a:solidFill>
-                <a:latin typeface="Arial"/>
-                <a:ea typeface="Arial"/>
-                <a:cs typeface="Arial"/>
-                <a:sym typeface="Arial"/>
-              </a:endParaRPr>
-            </a:p>
-          </p:txBody>
-        </p:sp>
-        <p:sp>
-          <p:nvSpPr>
-            <p:cNvPr id="15" name="Google Shape;571;gd93e1c5cec_0_402">
-              <a:extLst>
-                <a:ext uri="{FF2B5EF4-FFF2-40B4-BE49-F238E27FC236}">
-                  <a16:creationId xmlns:a16="http://schemas.microsoft.com/office/drawing/2014/main" id="{145E6B2A-E736-498B-A1AC-BBE586EF8E97}"/>
-                </a:ext>
-              </a:extLst>
-            </p:cNvPr>
-            <p:cNvSpPr/>
-            <p:nvPr/>
-          </p:nvSpPr>
-          <p:spPr>
-            <a:xfrm>
-              <a:off x="4968723" y="-32106"/>
-              <a:ext cx="145287" cy="14778"/>
-            </a:xfrm>
-            <a:custGeom>
-              <a:avLst/>
-              <a:gdLst/>
-              <a:ahLst/>
-              <a:cxnLst/>
-              <a:rect l="l" t="t" r="r" b="b"/>
-              <a:pathLst>
-                <a:path w="145287" h="14778" extrusionOk="0">
-                  <a:moveTo>
-                    <a:pt x="137899" y="0"/>
-                  </a:moveTo>
-                  <a:lnTo>
-                    <a:pt x="7389" y="0"/>
-                  </a:lnTo>
-                  <a:cubicBezTo>
-                    <a:pt x="3308" y="0"/>
-                    <a:pt x="0" y="3308"/>
-                    <a:pt x="0" y="7389"/>
-                  </a:cubicBezTo>
-                  <a:cubicBezTo>
-                    <a:pt x="0" y="11470"/>
-                    <a:pt x="3308" y="14778"/>
-                    <a:pt x="7389" y="14778"/>
-                  </a:cubicBezTo>
-                  <a:lnTo>
-                    <a:pt x="137899" y="14778"/>
-                  </a:lnTo>
-                  <a:cubicBezTo>
-                    <a:pt x="141980" y="14778"/>
-                    <a:pt x="145288" y="11470"/>
-                    <a:pt x="145288" y="7389"/>
-                  </a:cubicBezTo>
-                  <a:cubicBezTo>
-                    <a:pt x="145288" y="3308"/>
-                    <a:pt x="141980" y="0"/>
-                    <a:pt x="137899" y="0"/>
-                  </a:cubicBezTo>
-                  <a:close/>
-                </a:path>
-              </a:pathLst>
-            </a:custGeom>
-            <a:solidFill>
-              <a:srgbClr val="2AB5E8"/>
-            </a:solidFill>
-            <a:ln>
-              <a:noFill/>
-            </a:ln>
-          </p:spPr>
-          <p:txBody>
-            <a:bodyPr spcFirstLastPara="1" wrap="square" lIns="91425" tIns="45700" rIns="91425" bIns="45700" anchor="ctr" anchorCtr="0">
-              <a:noAutofit/>
-            </a:bodyPr>
-            <a:lstStyle/>
-            <a:p>
-              <a:pPr>
-                <a:buClr>
-                  <a:srgbClr val="000000"/>
-                </a:buClr>
-                <a:buSzPts val="1350"/>
-              </a:pPr>
-              <a:endParaRPr sz="1350" dirty="0">
-                <a:solidFill>
-                  <a:schemeClr val="dk1"/>
-                </a:solidFill>
-                <a:latin typeface="Arial"/>
-                <a:ea typeface="Arial"/>
-                <a:cs typeface="Arial"/>
-                <a:sym typeface="Arial"/>
-              </a:endParaRPr>
-            </a:p>
-          </p:txBody>
-        </p:sp>
-        <p:sp>
-          <p:nvSpPr>
-            <p:cNvPr id="16" name="Google Shape;572;gd93e1c5cec_0_402">
-              <a:extLst>
-                <a:ext uri="{FF2B5EF4-FFF2-40B4-BE49-F238E27FC236}">
-                  <a16:creationId xmlns:a16="http://schemas.microsoft.com/office/drawing/2014/main" id="{50E66EF1-53FE-43E4-8102-3711FB139B8B}"/>
-                </a:ext>
-              </a:extLst>
-            </p:cNvPr>
-            <p:cNvSpPr/>
-            <p:nvPr/>
-          </p:nvSpPr>
-          <p:spPr>
-            <a:xfrm>
-              <a:off x="4968723" y="3083"/>
-              <a:ext cx="145287" cy="14778"/>
-            </a:xfrm>
-            <a:custGeom>
-              <a:avLst/>
-              <a:gdLst/>
-              <a:ahLst/>
-              <a:cxnLst/>
-              <a:rect l="l" t="t" r="r" b="b"/>
-              <a:pathLst>
-                <a:path w="145287" h="14778" extrusionOk="0">
-                  <a:moveTo>
-                    <a:pt x="137899" y="0"/>
-                  </a:moveTo>
-                  <a:lnTo>
-                    <a:pt x="7389" y="0"/>
-                  </a:lnTo>
-                  <a:cubicBezTo>
-                    <a:pt x="3308" y="0"/>
-                    <a:pt x="0" y="3308"/>
-                    <a:pt x="0" y="7389"/>
-                  </a:cubicBezTo>
-                  <a:cubicBezTo>
-                    <a:pt x="0" y="11470"/>
-                    <a:pt x="3308" y="14778"/>
-                    <a:pt x="7389" y="14778"/>
-                  </a:cubicBezTo>
-                  <a:lnTo>
-                    <a:pt x="137899" y="14778"/>
-                  </a:lnTo>
-                  <a:cubicBezTo>
-                    <a:pt x="141980" y="14778"/>
-                    <a:pt x="145288" y="11470"/>
-                    <a:pt x="145288" y="7389"/>
-                  </a:cubicBezTo>
-                  <a:cubicBezTo>
-                    <a:pt x="145288" y="3308"/>
-                    <a:pt x="141980" y="0"/>
-                    <a:pt x="137899" y="0"/>
-                  </a:cubicBezTo>
-                  <a:close/>
-                </a:path>
-              </a:pathLst>
-            </a:custGeom>
-            <a:solidFill>
-              <a:srgbClr val="2AB5E8"/>
-            </a:solidFill>
-            <a:ln>
-              <a:noFill/>
-            </a:ln>
-          </p:spPr>
-          <p:txBody>
-            <a:bodyPr spcFirstLastPara="1" wrap="square" lIns="91425" tIns="45700" rIns="91425" bIns="45700" anchor="ctr" anchorCtr="0">
-              <a:noAutofit/>
-            </a:bodyPr>
-            <a:lstStyle/>
-            <a:p>
-              <a:pPr>
-                <a:buClr>
-                  <a:srgbClr val="000000"/>
-                </a:buClr>
-                <a:buSzPts val="1350"/>
-              </a:pPr>
-              <a:endParaRPr sz="1350" dirty="0">
-                <a:solidFill>
-                  <a:schemeClr val="dk1"/>
-                </a:solidFill>
-                <a:latin typeface="Arial"/>
-                <a:ea typeface="Arial"/>
-                <a:cs typeface="Arial"/>
-                <a:sym typeface="Arial"/>
-              </a:endParaRPr>
-            </a:p>
-          </p:txBody>
-        </p:sp>
-        <p:sp>
-          <p:nvSpPr>
-            <p:cNvPr id="17" name="Google Shape;573;gd93e1c5cec_0_402">
-              <a:extLst>
-                <a:ext uri="{FF2B5EF4-FFF2-40B4-BE49-F238E27FC236}">
-                  <a16:creationId xmlns:a16="http://schemas.microsoft.com/office/drawing/2014/main" id="{31FA75DF-166B-4470-BD87-7A583AE23463}"/>
-                </a:ext>
-              </a:extLst>
-            </p:cNvPr>
-            <p:cNvSpPr/>
-            <p:nvPr/>
-          </p:nvSpPr>
-          <p:spPr>
-            <a:xfrm>
-              <a:off x="4968723" y="38274"/>
-              <a:ext cx="145287" cy="14778"/>
-            </a:xfrm>
-            <a:custGeom>
-              <a:avLst/>
-              <a:gdLst/>
-              <a:ahLst/>
-              <a:cxnLst/>
-              <a:rect l="l" t="t" r="r" b="b"/>
-              <a:pathLst>
-                <a:path w="145287" h="14778" extrusionOk="0">
-                  <a:moveTo>
-                    <a:pt x="137899" y="0"/>
-                  </a:moveTo>
-                  <a:lnTo>
-                    <a:pt x="7389" y="0"/>
-                  </a:lnTo>
-                  <a:cubicBezTo>
-                    <a:pt x="3308" y="0"/>
-                    <a:pt x="0" y="3308"/>
-                    <a:pt x="0" y="7389"/>
-                  </a:cubicBezTo>
-                  <a:cubicBezTo>
-                    <a:pt x="0" y="11470"/>
-                    <a:pt x="3308" y="14778"/>
-                    <a:pt x="7389" y="14778"/>
-                  </a:cubicBezTo>
-                  <a:lnTo>
-                    <a:pt x="137899" y="14778"/>
-                  </a:lnTo>
-                  <a:cubicBezTo>
-                    <a:pt x="141980" y="14778"/>
-                    <a:pt x="145288" y="11470"/>
-                    <a:pt x="145288" y="7389"/>
-                  </a:cubicBezTo>
-                  <a:cubicBezTo>
-                    <a:pt x="145288" y="3308"/>
-                    <a:pt x="141980" y="0"/>
-                    <a:pt x="137899" y="0"/>
-                  </a:cubicBezTo>
-                  <a:close/>
-                </a:path>
-              </a:pathLst>
-            </a:custGeom>
-            <a:solidFill>
-              <a:srgbClr val="2AB5E8"/>
-            </a:solidFill>
-            <a:ln>
-              <a:noFill/>
-            </a:ln>
-          </p:spPr>
-          <p:txBody>
-            <a:bodyPr spcFirstLastPara="1" wrap="square" lIns="91425" tIns="45700" rIns="91425" bIns="45700" anchor="ctr" anchorCtr="0">
-              <a:noAutofit/>
-            </a:bodyPr>
-            <a:lstStyle/>
-            <a:p>
-              <a:pPr>
-                <a:buClr>
-                  <a:srgbClr val="000000"/>
-                </a:buClr>
-                <a:buSzPts val="1350"/>
-              </a:pPr>
-              <a:endParaRPr sz="1350" dirty="0">
-                <a:solidFill>
-                  <a:schemeClr val="dk1"/>
-                </a:solidFill>
-                <a:latin typeface="Arial"/>
-                <a:ea typeface="Arial"/>
-                <a:cs typeface="Arial"/>
-                <a:sym typeface="Arial"/>
-              </a:endParaRPr>
-            </a:p>
-          </p:txBody>
-        </p:sp>
-        <p:sp>
-          <p:nvSpPr>
-            <p:cNvPr id="18" name="Google Shape;574;gd93e1c5cec_0_402">
-              <a:extLst>
-                <a:ext uri="{FF2B5EF4-FFF2-40B4-BE49-F238E27FC236}">
-                  <a16:creationId xmlns:a16="http://schemas.microsoft.com/office/drawing/2014/main" id="{009C1FB9-5249-4C0E-9DEE-657BEED4B942}"/>
-                </a:ext>
-              </a:extLst>
-            </p:cNvPr>
-            <p:cNvSpPr/>
-            <p:nvPr/>
-          </p:nvSpPr>
-          <p:spPr>
-            <a:xfrm>
-              <a:off x="4930669" y="-189771"/>
-              <a:ext cx="222412" cy="292886"/>
-            </a:xfrm>
-            <a:custGeom>
-              <a:avLst/>
-              <a:gdLst/>
-              <a:ahLst/>
-              <a:cxnLst/>
-              <a:rect l="l" t="t" r="r" b="b"/>
-              <a:pathLst>
-                <a:path w="222412" h="292886" extrusionOk="0">
-                  <a:moveTo>
-                    <a:pt x="210867" y="0"/>
-                  </a:moveTo>
-                  <a:lnTo>
-                    <a:pt x="66872" y="0"/>
-                  </a:lnTo>
-                  <a:cubicBezTo>
-                    <a:pt x="63487" y="-19"/>
-                    <a:pt x="60270" y="1470"/>
-                    <a:pt x="58097" y="4064"/>
-                  </a:cubicBezTo>
-                  <a:lnTo>
-                    <a:pt x="2679" y="69550"/>
-                  </a:lnTo>
-                  <a:cubicBezTo>
-                    <a:pt x="935" y="71616"/>
-                    <a:pt x="-14" y="74236"/>
-                    <a:pt x="0" y="76939"/>
-                  </a:cubicBezTo>
-                  <a:lnTo>
-                    <a:pt x="0" y="281340"/>
-                  </a:lnTo>
-                  <a:cubicBezTo>
-                    <a:pt x="-51" y="287665"/>
-                    <a:pt x="5035" y="292835"/>
-                    <a:pt x="11360" y="292885"/>
-                  </a:cubicBezTo>
-                  <a:cubicBezTo>
-                    <a:pt x="11422" y="292886"/>
-                    <a:pt x="11484" y="292886"/>
-                    <a:pt x="11546" y="292885"/>
-                  </a:cubicBezTo>
-                  <a:lnTo>
-                    <a:pt x="210867" y="292885"/>
-                  </a:lnTo>
-                  <a:cubicBezTo>
-                    <a:pt x="217192" y="292936"/>
-                    <a:pt x="222361" y="287851"/>
-                    <a:pt x="222412" y="281526"/>
-                  </a:cubicBezTo>
-                  <a:cubicBezTo>
-                    <a:pt x="222413" y="281464"/>
-                    <a:pt x="222413" y="281402"/>
-                    <a:pt x="222412" y="281340"/>
-                  </a:cubicBezTo>
-                  <a:lnTo>
-                    <a:pt x="222412" y="11546"/>
-                  </a:lnTo>
-                  <a:cubicBezTo>
-                    <a:pt x="222463" y="5221"/>
-                    <a:pt x="217377" y="52"/>
-                    <a:pt x="211052" y="0"/>
-                  </a:cubicBezTo>
-                  <a:cubicBezTo>
-                    <a:pt x="210990" y="0"/>
-                    <a:pt x="210928" y="0"/>
-                    <a:pt x="210867" y="0"/>
-                  </a:cubicBezTo>
-                  <a:close/>
-                  <a:moveTo>
-                    <a:pt x="58651" y="39163"/>
-                  </a:moveTo>
-                  <a:lnTo>
-                    <a:pt x="58651" y="70381"/>
-                  </a:lnTo>
-                  <a:lnTo>
-                    <a:pt x="32697" y="70381"/>
-                  </a:lnTo>
-                  <a:close/>
-                  <a:moveTo>
-                    <a:pt x="198952" y="269795"/>
-                  </a:moveTo>
-                  <a:lnTo>
-                    <a:pt x="23461" y="269795"/>
-                  </a:lnTo>
-                  <a:lnTo>
-                    <a:pt x="23461" y="93472"/>
-                  </a:lnTo>
-                  <a:lnTo>
-                    <a:pt x="70566" y="93472"/>
-                  </a:lnTo>
-                  <a:cubicBezTo>
-                    <a:pt x="76943" y="93472"/>
-                    <a:pt x="82112" y="88304"/>
-                    <a:pt x="82112" y="81927"/>
-                  </a:cubicBezTo>
-                  <a:lnTo>
-                    <a:pt x="82112" y="23091"/>
-                  </a:lnTo>
-                  <a:lnTo>
-                    <a:pt x="198952" y="23091"/>
-                  </a:lnTo>
-                  <a:close/>
-                </a:path>
-              </a:pathLst>
-            </a:custGeom>
-            <a:solidFill>
-              <a:srgbClr val="2AB5E8"/>
-            </a:solidFill>
-            <a:ln>
-              <a:noFill/>
-            </a:ln>
-          </p:spPr>
-          <p:txBody>
-            <a:bodyPr spcFirstLastPara="1" wrap="square" lIns="91425" tIns="45700" rIns="91425" bIns="45700" anchor="ctr" anchorCtr="0">
-              <a:noAutofit/>
-            </a:bodyPr>
-            <a:lstStyle/>
-            <a:p>
-              <a:pPr>
-                <a:buClr>
-                  <a:srgbClr val="000000"/>
-                </a:buClr>
-                <a:buSzPts val="1350"/>
-              </a:pPr>
-              <a:endParaRPr sz="1350" dirty="0">
-                <a:solidFill>
-                  <a:schemeClr val="dk1"/>
-                </a:solidFill>
-                <a:latin typeface="Arial"/>
-                <a:ea typeface="Arial"/>
-                <a:cs typeface="Arial"/>
-                <a:sym typeface="Arial"/>
-              </a:endParaRPr>
-            </a:p>
-          </p:txBody>
-        </p:sp>
-      </p:grpSp>
-      <p:sp>
-        <p:nvSpPr>
-          <p:cNvPr id="19" name="Rectangle 18">
-            <a:extLst>
-              <a:ext uri="{FF2B5EF4-FFF2-40B4-BE49-F238E27FC236}">
-                <a16:creationId xmlns:a16="http://schemas.microsoft.com/office/drawing/2014/main" id="{AE5B2C9C-0417-4C7C-9ED9-E0CC577490F4}"/>
-              </a:ext>
-            </a:extLst>
-          </p:cNvPr>
-          <p:cNvSpPr/>
-          <p:nvPr/>
-        </p:nvSpPr>
-        <p:spPr bwMode="auto">
-          <a:xfrm>
-            <a:off x="8138160" y="5029200"/>
-            <a:ext cx="4297680" cy="2834640"/>
-          </a:xfrm>
-          <a:prstGeom prst="rect">
-            <a:avLst/>
-          </a:prstGeom>
-          <a:noFill/>
-          <a:ln w="12700">
-            <a:solidFill>
-              <a:schemeClr val="tx1"/>
-            </a:solidFill>
-          </a:ln>
-        </p:spPr>
-        <p:style>
-          <a:lnRef idx="2">
-            <a:schemeClr val="accent1">
-              <a:shade val="50000"/>
-            </a:schemeClr>
-          </a:lnRef>
-          <a:fillRef idx="1">
-            <a:schemeClr val="accent1"/>
-          </a:fillRef>
-          <a:effectRef idx="0">
-            <a:schemeClr val="accent1"/>
-          </a:effectRef>
-          <a:fontRef idx="minor">
-            <a:schemeClr val="lt1"/>
-          </a:fontRef>
-        </p:style>
-        <p:txBody>
-          <a:bodyPr lIns="502920" tIns="91440"/>
-          <a:lstStyle/>
-          <a:p>
-            <a:pPr>
-              <a:defRPr/>
-            </a:pPr>
-            <a:r>
-              <a:rPr lang="en-US" sz="1200" dirty="0">
-                <a:solidFill>
-                  <a:sysClr val="windowText" lastClr="000000"/>
-                </a:solidFill>
-                <a:latin typeface="Arial" panose="020B0604020202020204" pitchFamily="34" charset="0"/>
-                <a:cs typeface="Arial" panose="020B0604020202020204" pitchFamily="34" charset="0"/>
-              </a:rPr>
-              <a:t>AWS Cloud</a:t>
-            </a:r>
-          </a:p>
-        </p:txBody>
-      </p:sp>
-      <p:pic>
-        <p:nvPicPr>
-          <p:cNvPr id="20" name="Graphic 19">
-            <a:extLst>
-              <a:ext uri="{FF2B5EF4-FFF2-40B4-BE49-F238E27FC236}">
-                <a16:creationId xmlns:a16="http://schemas.microsoft.com/office/drawing/2014/main" id="{C93ED710-D46F-455D-B2ED-E5093F001166}"/>
-              </a:ext>
-            </a:extLst>
-          </p:cNvPr>
-          <p:cNvPicPr>
-            <a:picLocks noChangeAspect="1"/>
-          </p:cNvPicPr>
-          <p:nvPr/>
-        </p:nvPicPr>
-        <p:blipFill>
-          <a:blip r:embed="rId2">
-            <a:extLst>
-              <a:ext uri="{96DAC541-7B7A-43D3-8B79-37D633B846F1}">
-                <asvg:svgBlip xmlns:asvg="http://schemas.microsoft.com/office/drawing/2016/SVG/main" r:embed="rId3"/>
-              </a:ext>
-            </a:extLst>
-          </a:blip>
-          <a:srcRect/>
-          <a:stretch/>
-        </p:blipFill>
-        <p:spPr>
-          <a:xfrm>
-            <a:off x="8138160" y="5029200"/>
-            <a:ext cx="381000" cy="381000"/>
-          </a:xfrm>
-          <a:prstGeom prst="rect">
-            <a:avLst/>
-          </a:prstGeom>
-        </p:spPr>
-      </p:pic>
-      <p:pic>
-        <p:nvPicPr>
-          <p:cNvPr id="21" name="Graphic 22">
-            <a:extLst>
-              <a:ext uri="{FF2B5EF4-FFF2-40B4-BE49-F238E27FC236}">
-                <a16:creationId xmlns:a16="http://schemas.microsoft.com/office/drawing/2014/main" id="{55985D16-1DA1-45E4-87C9-77892755E5D0}"/>
-              </a:ext>
-            </a:extLst>
-          </p:cNvPr>
-          <p:cNvPicPr>
-            <a:picLocks noChangeAspect="1" noChangeArrowheads="1"/>
-          </p:cNvPicPr>
-          <p:nvPr/>
-        </p:nvPicPr>
-        <p:blipFill>
-          <a:blip r:embed="rId4">
-            <a:extLst>
-              <a:ext uri="{28A0092B-C50C-407E-A947-70E740481C1C}">
-                <a14:useLocalDpi xmlns:a14="http://schemas.microsoft.com/office/drawing/2010/main" val="0"/>
-              </a:ext>
-            </a:extLst>
-          </a:blip>
-          <a:srcRect/>
-          <a:stretch>
-            <a:fillRect/>
-          </a:stretch>
-        </p:blipFill>
-        <p:spPr bwMode="auto">
-          <a:xfrm>
-            <a:off x="10071645" y="5381906"/>
-            <a:ext cx="762000" cy="762000"/>
-          </a:xfrm>
-          <a:prstGeom prst="rect">
-            <a:avLst/>
-          </a:prstGeom>
-          <a:noFill/>
-          <a:ln>
-            <a:noFill/>
-          </a:ln>
-          <a:extLst>
-            <a:ext uri="{909E8E84-426E-40DD-AFC4-6F175D3DCCD1}">
-              <a14:hiddenFill xmlns:a14="http://schemas.microsoft.com/office/drawing/2010/main">
-                <a:solidFill>
-                  <a:srgbClr val="FFFFFF"/>
-                </a:solidFill>
-              </a14:hiddenFill>
-            </a:ext>
-            <a:ext uri="{91240B29-F687-4F45-9708-019B960494DF}">
-              <a14:hiddenLine xmlns:a14="http://schemas.microsoft.com/office/drawing/2010/main" w="9525">
-                <a:solidFill>
-                  <a:srgbClr val="000000"/>
-                </a:solidFill>
-                <a:miter lim="800000"/>
-                <a:headEnd/>
-                <a:tailEnd/>
-              </a14:hiddenLine>
-            </a:ext>
-          </a:extLst>
-        </p:spPr>
-      </p:pic>
       <p:sp>
         <p:nvSpPr>
           <p:cNvPr id="22" name="TextBox 15">
@@ -4737,7 +3521,7 @@
         </p:nvSpPr>
         <p:spPr bwMode="auto">
           <a:xfrm>
-            <a:off x="9666170" y="6146018"/>
+            <a:off x="11359966" y="6005478"/>
             <a:ext cx="1572950" cy="276999"/>
           </a:xfrm>
           <a:prstGeom prst="rect">
@@ -4898,8 +3682,8 @@
         </p:nvSpPr>
         <p:spPr bwMode="auto">
           <a:xfrm>
-            <a:off x="11532731" y="6144768"/>
-            <a:ext cx="861339" cy="261610"/>
+            <a:off x="13147947" y="5856589"/>
+            <a:ext cx="861339" cy="276999"/>
           </a:xfrm>
           <a:prstGeom prst="rect">
             <a:avLst/>
@@ -5033,7 +3817,7 @@
           <a:p>
             <a:pPr algn="ctr" eaLnBrk="1" hangingPunct="1"/>
             <a:r>
-              <a:rPr lang="en-US" altLang="en-US" sz="1100" dirty="0">
+              <a:rPr lang="en-US" altLang="en-US" sz="1200" dirty="0">
                 <a:latin typeface="Arial" panose="020B0604020202020204" pitchFamily="34" charset="0"/>
                 <a:ea typeface="Amazon Ember" panose="020B0603020204020204" pitchFamily="34" charset="0"/>
                 <a:cs typeface="Arial" panose="020B0604020202020204" pitchFamily="34" charset="0"/>
@@ -5043,37 +3827,24 @@
           </a:p>
         </p:txBody>
       </p:sp>
-      <p:pic>
-        <p:nvPicPr>
-          <p:cNvPr id="24" name="Graphic 14">
+      <p:sp>
+        <p:nvSpPr>
+          <p:cNvPr id="27" name="TextBox 16">
             <a:extLst>
               <a:ext uri="{FF2B5EF4-FFF2-40B4-BE49-F238E27FC236}">
-                <a16:creationId xmlns:a16="http://schemas.microsoft.com/office/drawing/2014/main" id="{C1268649-565B-4944-87C9-6A791A989007}"/>
+                <a16:creationId xmlns:a16="http://schemas.microsoft.com/office/drawing/2014/main" id="{5A2DD4E4-76C3-4329-9D39-9CCBD8A4A2E1}"/>
               </a:ext>
             </a:extLst>
           </p:cNvPr>
-          <p:cNvPicPr>
-            <a:picLocks noChangeAspect="1" noChangeArrowheads="1"/>
-          </p:cNvPicPr>
+          <p:cNvSpPr txBox="1">
+            <a:spLocks noChangeArrowheads="1"/>
+          </p:cNvSpPr>
           <p:nvPr/>
-        </p:nvPicPr>
-        <p:blipFill>
-          <a:blip r:embed="rId5">
-            <a:extLst>
-              <a:ext uri="{28A0092B-C50C-407E-A947-70E740481C1C}">
-                <a14:useLocalDpi xmlns:a14="http://schemas.microsoft.com/office/drawing/2010/main" val="0"/>
-              </a:ext>
-            </a:extLst>
-          </a:blip>
-          <a:srcRect/>
-          <a:stretch>
-            <a:fillRect/>
-          </a:stretch>
-        </p:blipFill>
+        </p:nvSpPr>
         <p:spPr bwMode="auto">
           <a:xfrm>
-            <a:off x="11734800" y="5532120"/>
-            <a:ext cx="457200" cy="457200"/>
+            <a:off x="9874989" y="5856589"/>
+            <a:ext cx="1554480" cy="461665"/>
           </a:xfrm>
           <a:prstGeom prst="rect">
             <a:avLst/>
@@ -5102,53 +3873,6 @@
             </a:ext>
           </a:extLst>
         </p:spPr>
-      </p:pic>
-      <p:sp>
-        <p:nvSpPr>
-          <p:cNvPr id="25" name="TextBox 17">
-            <a:extLst>
-              <a:ext uri="{FF2B5EF4-FFF2-40B4-BE49-F238E27FC236}">
-                <a16:creationId xmlns:a16="http://schemas.microsoft.com/office/drawing/2014/main" id="{A563F234-7E2D-4D17-AE57-0361908A86D5}"/>
-              </a:ext>
-            </a:extLst>
-          </p:cNvPr>
-          <p:cNvSpPr txBox="1">
-            <a:spLocks noChangeArrowheads="1"/>
-          </p:cNvSpPr>
-          <p:nvPr/>
-        </p:nvSpPr>
-        <p:spPr bwMode="auto">
-          <a:xfrm>
-            <a:off x="8306066" y="7489778"/>
-            <a:ext cx="1280160" cy="274320"/>
-          </a:xfrm>
-          <a:prstGeom prst="rect">
-            <a:avLst/>
-          </a:prstGeom>
-          <a:noFill/>
-          <a:ln>
-            <a:noFill/>
-          </a:ln>
-          <a:extLst>
-            <a:ext uri="{909E8E84-426E-40DD-AFC4-6F175D3DCCD1}">
-              <a14:hiddenFill xmlns:a14="http://schemas.microsoft.com/office/drawing/2010/main">
-                <a:solidFill>
-                  <a:srgbClr val="FFFFFF"/>
-                </a:solidFill>
-              </a14:hiddenFill>
-            </a:ext>
-            <a:ext uri="{91240B29-F687-4F45-9708-019B960494DF}">
-              <a14:hiddenLine xmlns:a14="http://schemas.microsoft.com/office/drawing/2010/main" w="9525">
-                <a:solidFill>
-                  <a:srgbClr val="000000"/>
-                </a:solidFill>
-                <a:miter lim="800000"/>
-                <a:headEnd/>
-                <a:tailEnd/>
-              </a14:hiddenLine>
-            </a:ext>
-          </a:extLst>
-        </p:spPr>
         <p:txBody>
           <a:bodyPr wrap="square">
             <a:spAutoFit/>
@@ -5254,228 +3978,7 @@
           <a:p>
             <a:pPr algn="ctr" eaLnBrk="1" hangingPunct="1"/>
             <a:r>
-              <a:rPr lang="en-US" altLang="en-US" sz="1100" dirty="0">
-                <a:latin typeface="Arial" panose="020B0604020202020204" pitchFamily="34" charset="0"/>
-                <a:ea typeface="Amazon Ember" panose="020B0603020204020204" pitchFamily="34" charset="0"/>
-                <a:cs typeface="Arial" panose="020B0604020202020204" pitchFamily="34" charset="0"/>
-              </a:rPr>
-              <a:t>Lambda function</a:t>
-            </a:r>
-          </a:p>
-        </p:txBody>
-      </p:sp>
-      <p:pic>
-        <p:nvPicPr>
-          <p:cNvPr id="26" name="Graphic 13">
-            <a:extLst>
-              <a:ext uri="{FF2B5EF4-FFF2-40B4-BE49-F238E27FC236}">
-                <a16:creationId xmlns:a16="http://schemas.microsoft.com/office/drawing/2014/main" id="{0F2C06D5-7A98-4618-825B-AA54583514AE}"/>
-              </a:ext>
-            </a:extLst>
-          </p:cNvPr>
-          <p:cNvPicPr>
-            <a:picLocks noChangeAspect="1" noChangeArrowheads="1"/>
-          </p:cNvPicPr>
-          <p:nvPr/>
-        </p:nvPicPr>
-        <p:blipFill>
-          <a:blip r:embed="rId6">
-            <a:extLst>
-              <a:ext uri="{28A0092B-C50C-407E-A947-70E740481C1C}">
-                <a14:useLocalDpi xmlns:a14="http://schemas.microsoft.com/office/drawing/2010/main" val="0"/>
-              </a:ext>
-            </a:extLst>
-          </a:blip>
-          <a:srcRect/>
-          <a:stretch>
-            <a:fillRect/>
-          </a:stretch>
-        </p:blipFill>
-        <p:spPr bwMode="auto">
-          <a:xfrm>
-            <a:off x="8717280" y="7031396"/>
-            <a:ext cx="457200" cy="457200"/>
-          </a:xfrm>
-          <a:prstGeom prst="rect">
-            <a:avLst/>
-          </a:prstGeom>
-          <a:noFill/>
-          <a:ln>
-            <a:noFill/>
-          </a:ln>
-          <a:extLst>
-            <a:ext uri="{909E8E84-426E-40DD-AFC4-6F175D3DCCD1}">
-              <a14:hiddenFill xmlns:a14="http://schemas.microsoft.com/office/drawing/2010/main">
-                <a:solidFill>
-                  <a:srgbClr val="FFFFFF"/>
-                </a:solidFill>
-              </a14:hiddenFill>
-            </a:ext>
-            <a:ext uri="{91240B29-F687-4F45-9708-019B960494DF}">
-              <a14:hiddenLine xmlns:a14="http://schemas.microsoft.com/office/drawing/2010/main" w="9525">
-                <a:solidFill>
-                  <a:srgbClr val="000000"/>
-                </a:solidFill>
-                <a:miter lim="800000"/>
-                <a:headEnd/>
-                <a:tailEnd/>
-              </a14:hiddenLine>
-            </a:ext>
-          </a:extLst>
-        </p:spPr>
-      </p:pic>
-      <p:sp>
-        <p:nvSpPr>
-          <p:cNvPr id="27" name="TextBox 16">
-            <a:extLst>
-              <a:ext uri="{FF2B5EF4-FFF2-40B4-BE49-F238E27FC236}">
-                <a16:creationId xmlns:a16="http://schemas.microsoft.com/office/drawing/2014/main" id="{5A2DD4E4-76C3-4329-9D39-9CCBD8A4A2E1}"/>
-              </a:ext>
-            </a:extLst>
-          </p:cNvPr>
-          <p:cNvSpPr txBox="1">
-            <a:spLocks noChangeArrowheads="1"/>
-          </p:cNvSpPr>
-          <p:nvPr/>
-        </p:nvSpPr>
-        <p:spPr bwMode="auto">
-          <a:xfrm>
-            <a:off x="8169286" y="6144768"/>
-            <a:ext cx="1554480" cy="430887"/>
-          </a:xfrm>
-          <a:prstGeom prst="rect">
-            <a:avLst/>
-          </a:prstGeom>
-          <a:noFill/>
-          <a:ln>
-            <a:noFill/>
-          </a:ln>
-          <a:extLst>
-            <a:ext uri="{909E8E84-426E-40DD-AFC4-6F175D3DCCD1}">
-              <a14:hiddenFill xmlns:a14="http://schemas.microsoft.com/office/drawing/2010/main">
-                <a:solidFill>
-                  <a:srgbClr val="FFFFFF"/>
-                </a:solidFill>
-              </a14:hiddenFill>
-            </a:ext>
-            <a:ext uri="{91240B29-F687-4F45-9708-019B960494DF}">
-              <a14:hiddenLine xmlns:a14="http://schemas.microsoft.com/office/drawing/2010/main" w="9525">
-                <a:solidFill>
-                  <a:srgbClr val="000000"/>
-                </a:solidFill>
-                <a:miter lim="800000"/>
-                <a:headEnd/>
-                <a:tailEnd/>
-              </a14:hiddenLine>
-            </a:ext>
-          </a:extLst>
-        </p:spPr>
-        <p:txBody>
-          <a:bodyPr wrap="square">
-            <a:spAutoFit/>
-          </a:bodyPr>
-          <a:lstStyle>
-            <a:lvl1pPr>
-              <a:defRPr>
-                <a:solidFill>
-                  <a:schemeClr val="tx1"/>
-                </a:solidFill>
-                <a:latin typeface="Calibri" panose="020F0502020204030204" pitchFamily="34" charset="0"/>
-              </a:defRPr>
-            </a:lvl1pPr>
-            <a:lvl2pPr marL="742950" indent="-285750">
-              <a:defRPr>
-                <a:solidFill>
-                  <a:schemeClr val="tx1"/>
-                </a:solidFill>
-                <a:latin typeface="Calibri" panose="020F0502020204030204" pitchFamily="34" charset="0"/>
-              </a:defRPr>
-            </a:lvl2pPr>
-            <a:lvl3pPr marL="1143000" indent="-228600">
-              <a:defRPr>
-                <a:solidFill>
-                  <a:schemeClr val="tx1"/>
-                </a:solidFill>
-                <a:latin typeface="Calibri" panose="020F0502020204030204" pitchFamily="34" charset="0"/>
-              </a:defRPr>
-            </a:lvl3pPr>
-            <a:lvl4pPr marL="1600200" indent="-228600">
-              <a:defRPr>
-                <a:solidFill>
-                  <a:schemeClr val="tx1"/>
-                </a:solidFill>
-                <a:latin typeface="Calibri" panose="020F0502020204030204" pitchFamily="34" charset="0"/>
-              </a:defRPr>
-            </a:lvl4pPr>
-            <a:lvl5pPr marL="2057400" indent="-228600">
-              <a:defRPr>
-                <a:solidFill>
-                  <a:schemeClr val="tx1"/>
-                </a:solidFill>
-                <a:latin typeface="Calibri" panose="020F0502020204030204" pitchFamily="34" charset="0"/>
-              </a:defRPr>
-            </a:lvl5pPr>
-            <a:lvl6pPr marL="2514600" indent="-228600" eaLnBrk="0" fontAlgn="base" hangingPunct="0">
-              <a:spcBef>
-                <a:spcPct val="0"/>
-              </a:spcBef>
-              <a:spcAft>
-                <a:spcPct val="0"/>
-              </a:spcAft>
-              <a:defRPr>
-                <a:solidFill>
-                  <a:schemeClr val="tx1"/>
-                </a:solidFill>
-                <a:latin typeface="Calibri" panose="020F0502020204030204" pitchFamily="34" charset="0"/>
-              </a:defRPr>
-            </a:lvl6pPr>
-            <a:lvl7pPr marL="2971800" indent="-228600" eaLnBrk="0" fontAlgn="base" hangingPunct="0">
-              <a:spcBef>
-                <a:spcPct val="0"/>
-              </a:spcBef>
-              <a:spcAft>
-                <a:spcPct val="0"/>
-              </a:spcAft>
-              <a:defRPr>
-                <a:solidFill>
-                  <a:schemeClr val="tx1"/>
-                </a:solidFill>
-                <a:latin typeface="Calibri" panose="020F0502020204030204" pitchFamily="34" charset="0"/>
-              </a:defRPr>
-            </a:lvl7pPr>
-            <a:lvl8pPr marL="3429000" indent="-228600" eaLnBrk="0" fontAlgn="base" hangingPunct="0">
-              <a:spcBef>
-                <a:spcPct val="0"/>
-              </a:spcBef>
-              <a:spcAft>
-                <a:spcPct val="0"/>
-              </a:spcAft>
-              <a:defRPr>
-                <a:solidFill>
-                  <a:schemeClr val="tx1"/>
-                </a:solidFill>
-                <a:latin typeface="Calibri" panose="020F0502020204030204" pitchFamily="34" charset="0"/>
-              </a:defRPr>
-            </a:lvl8pPr>
-            <a:lvl9pPr marL="3886200" indent="-228600" eaLnBrk="0" fontAlgn="base" hangingPunct="0">
-              <a:spcBef>
-                <a:spcPct val="0"/>
-              </a:spcBef>
-              <a:spcAft>
-                <a:spcPct val="0"/>
-              </a:spcAft>
-              <a:defRPr>
-                <a:solidFill>
-                  <a:schemeClr val="tx1"/>
-                </a:solidFill>
-                <a:latin typeface="Calibri" panose="020F0502020204030204" pitchFamily="34" charset="0"/>
-              </a:defRPr>
-            </a:lvl9pPr>
-          </a:lstStyle>
-          <a:p>
-            <a:pPr algn="ctr" eaLnBrk="1" hangingPunct="1"/>
-            <a:r>
-              <a:rPr lang="en-US" altLang="en-US" sz="1100" dirty="0">
+              <a:rPr lang="en-US" altLang="en-US" sz="1200" dirty="0">
                 <a:latin typeface="Arial" panose="020B0604020202020204" pitchFamily="34" charset="0"/>
                 <a:ea typeface="Amazon Ember" panose="020B0603020204020204" pitchFamily="34" charset="0"/>
                 <a:cs typeface="Arial" panose="020B0604020202020204" pitchFamily="34" charset="0"/>
@@ -5483,141 +3986,19 @@
               <a:t>API Gateway</a:t>
             </a:r>
             <a:br>
-              <a:rPr lang="en-US" altLang="en-US" sz="1100" dirty="0">
+              <a:rPr lang="en-US" altLang="en-US" sz="1200" dirty="0">
                 <a:latin typeface="Arial" panose="020B0604020202020204" pitchFamily="34" charset="0"/>
                 <a:ea typeface="Amazon Ember" panose="020B0603020204020204" pitchFamily="34" charset="0"/>
                 <a:cs typeface="Arial" panose="020B0604020202020204" pitchFamily="34" charset="0"/>
               </a:rPr>
             </a:br>
             <a:r>
-              <a:rPr lang="en-US" altLang="en-US" sz="1100" dirty="0">
+              <a:rPr lang="en-US" altLang="en-US" sz="1200" dirty="0">
                 <a:latin typeface="Arial" panose="020B0604020202020204" pitchFamily="34" charset="0"/>
                 <a:ea typeface="Amazon Ember" panose="020B0603020204020204" pitchFamily="34" charset="0"/>
                 <a:cs typeface="Arial" panose="020B0604020202020204" pitchFamily="34" charset="0"/>
               </a:rPr>
               <a:t>endpoint</a:t>
-            </a:r>
-          </a:p>
-        </p:txBody>
-      </p:sp>
-      <p:pic>
-        <p:nvPicPr>
-          <p:cNvPr id="28" name="Graphic 6">
-            <a:extLst>
-              <a:ext uri="{FF2B5EF4-FFF2-40B4-BE49-F238E27FC236}">
-                <a16:creationId xmlns:a16="http://schemas.microsoft.com/office/drawing/2014/main" id="{FF931E29-5B35-4310-999C-42AE3B2F1736}"/>
-              </a:ext>
-            </a:extLst>
-          </p:cNvPr>
-          <p:cNvPicPr>
-            <a:picLocks noChangeAspect="1" noChangeArrowheads="1"/>
-          </p:cNvPicPr>
-          <p:nvPr/>
-        </p:nvPicPr>
-        <p:blipFill>
-          <a:blip r:embed="rId7">
-            <a:extLst>
-              <a:ext uri="{96DAC541-7B7A-43D3-8B79-37D633B846F1}">
-                <asvg:svgBlip xmlns:asvg="http://schemas.microsoft.com/office/drawing/2016/SVG/main" r:embed="rId8"/>
-              </a:ext>
-            </a:extLst>
-          </a:blip>
-          <a:srcRect/>
-          <a:stretch/>
-        </p:blipFill>
-        <p:spPr bwMode="auto">
-          <a:xfrm>
-            <a:off x="8717280" y="5532120"/>
-            <a:ext cx="457200" cy="457200"/>
-          </a:xfrm>
-          <a:prstGeom prst="rect">
-            <a:avLst/>
-          </a:prstGeom>
-          <a:noFill/>
-          <a:ln>
-            <a:noFill/>
-          </a:ln>
-          <a:extLst>
-            <a:ext uri="{909E8E84-426E-40DD-AFC4-6F175D3DCCD1}">
-              <a14:hiddenFill xmlns:a14="http://schemas.microsoft.com/office/drawing/2010/main">
-                <a:solidFill>
-                  <a:srgbClr val="FFFFFF"/>
-                </a:solidFill>
-              </a14:hiddenFill>
-            </a:ext>
-            <a:ext uri="{91240B29-F687-4F45-9708-019B960494DF}">
-              <a14:hiddenLine xmlns:a14="http://schemas.microsoft.com/office/drawing/2010/main" w="9525">
-                <a:solidFill>
-                  <a:srgbClr val="000000"/>
-                </a:solidFill>
-                <a:miter lim="800000"/>
-                <a:headEnd/>
-                <a:tailEnd/>
-              </a14:hiddenLine>
-            </a:ext>
-          </a:extLst>
-        </p:spPr>
-      </p:pic>
-      <p:sp>
-        <p:nvSpPr>
-          <p:cNvPr id="29" name="Rectangle 28">
-            <a:extLst>
-              <a:ext uri="{FF2B5EF4-FFF2-40B4-BE49-F238E27FC236}">
-                <a16:creationId xmlns:a16="http://schemas.microsoft.com/office/drawing/2014/main" id="{2A6819DD-224A-4D58-AC28-6461D0AD0C0A}"/>
-              </a:ext>
-            </a:extLst>
-          </p:cNvPr>
-          <p:cNvSpPr/>
-          <p:nvPr/>
-        </p:nvSpPr>
-        <p:spPr>
-          <a:xfrm>
-            <a:off x="6035040" y="5029200"/>
-            <a:ext cx="1737360" cy="2834640"/>
-          </a:xfrm>
-          <a:prstGeom prst="rect">
-            <a:avLst/>
-          </a:prstGeom>
-          <a:noFill/>
-          <a:ln w="12700">
-            <a:solidFill>
-              <a:srgbClr val="5A6B86"/>
-            </a:solidFill>
-            <a:prstDash val="dash"/>
-          </a:ln>
-        </p:spPr>
-        <p:style>
-          <a:lnRef idx="2">
-            <a:schemeClr val="accent1">
-              <a:shade val="50000"/>
-            </a:schemeClr>
-          </a:lnRef>
-          <a:fillRef idx="1">
-            <a:schemeClr val="accent1"/>
-          </a:fillRef>
-          <a:effectRef idx="0">
-            <a:schemeClr val="accent1"/>
-          </a:effectRef>
-          <a:fontRef idx="minor">
-            <a:schemeClr val="lt1"/>
-          </a:fontRef>
-        </p:style>
-        <p:txBody>
-          <a:bodyPr tIns="91440"/>
-          <a:lstStyle/>
-          <a:p>
-            <a:pPr algn="ctr">
-              <a:defRPr/>
-            </a:pPr>
-            <a:r>
-              <a:rPr lang="en-US" sz="1200" dirty="0">
-                <a:solidFill>
-                  <a:srgbClr val="5A6B86"/>
-                </a:solidFill>
-                <a:latin typeface="Arial" panose="020B0604020202020204" pitchFamily="34" charset="0"/>
-                <a:cs typeface="Arial" panose="020B0604020202020204" pitchFamily="34" charset="0"/>
-              </a:rPr>
-              <a:t>     Snowflake account</a:t>
             </a:r>
           </a:p>
         </p:txBody>
@@ -5633,14 +4014,15 @@
           </p:cNvPr>
           <p:cNvCxnSpPr>
             <a:cxnSpLocks/>
+            <a:stCxn id="61" idx="0"/>
             <a:endCxn id="59" idx="2"/>
           </p:cNvCxnSpPr>
           <p:nvPr/>
         </p:nvCxnSpPr>
         <p:spPr>
-          <a:xfrm flipH="1" flipV="1">
-            <a:off x="6915190" y="6384737"/>
-            <a:ext cx="652" cy="699386"/>
+          <a:xfrm flipV="1">
+            <a:off x="8549640" y="6317715"/>
+            <a:ext cx="450" cy="540285"/>
           </a:xfrm>
           <a:prstGeom prst="straightConnector1">
             <a:avLst/>
@@ -5679,14 +4061,15 @@
           </p:cNvPr>
           <p:cNvCxnSpPr>
             <a:cxnSpLocks/>
-            <a:endCxn id="28" idx="1"/>
+            <a:stCxn id="54" idx="3"/>
+            <a:endCxn id="43" idx="1"/>
           </p:cNvCxnSpPr>
           <p:nvPr/>
         </p:nvCxnSpPr>
         <p:spPr>
           <a:xfrm>
-            <a:off x="7034532" y="5753538"/>
-            <a:ext cx="1682748" cy="7183"/>
+            <a:off x="8778240" y="5623560"/>
+            <a:ext cx="1645920" cy="0"/>
           </a:xfrm>
           <a:prstGeom prst="straightConnector1">
             <a:avLst/>
@@ -5725,14 +4108,15 @@
           </p:cNvPr>
           <p:cNvCxnSpPr>
             <a:cxnSpLocks/>
-            <a:endCxn id="26" idx="1"/>
+            <a:stCxn id="61" idx="3"/>
+            <a:endCxn id="49" idx="1"/>
           </p:cNvCxnSpPr>
           <p:nvPr/>
         </p:nvCxnSpPr>
         <p:spPr>
           <a:xfrm>
-            <a:off x="7034532" y="7259996"/>
-            <a:ext cx="1682748" cy="0"/>
+            <a:off x="8778240" y="7086600"/>
+            <a:ext cx="1645920" cy="0"/>
           </a:xfrm>
           <a:prstGeom prst="straightConnector1">
             <a:avLst/>
@@ -5771,15 +4155,15 @@
           </p:cNvPr>
           <p:cNvCxnSpPr>
             <a:cxnSpLocks/>
-            <a:stCxn id="28" idx="3"/>
-            <a:endCxn id="21" idx="1"/>
+            <a:stCxn id="43" idx="3"/>
+            <a:endCxn id="41" idx="1"/>
           </p:cNvCxnSpPr>
           <p:nvPr/>
         </p:nvCxnSpPr>
         <p:spPr>
-          <a:xfrm>
-            <a:off x="9174481" y="5760720"/>
-            <a:ext cx="897165" cy="2186"/>
+          <a:xfrm flipV="1">
+            <a:off x="10881360" y="5622520"/>
+            <a:ext cx="822960" cy="1040"/>
           </a:xfrm>
           <a:prstGeom prst="straightConnector1">
             <a:avLst/>
@@ -5818,15 +4202,15 @@
           </p:cNvPr>
           <p:cNvCxnSpPr>
             <a:cxnSpLocks/>
-            <a:stCxn id="21" idx="3"/>
-            <a:endCxn id="24" idx="1"/>
+            <a:stCxn id="41" idx="3"/>
+            <a:endCxn id="45" idx="1"/>
           </p:cNvCxnSpPr>
           <p:nvPr/>
         </p:nvCxnSpPr>
         <p:spPr>
-          <a:xfrm flipV="1">
-            <a:off x="10833646" y="5760720"/>
-            <a:ext cx="901155" cy="2186"/>
+          <a:xfrm>
+            <a:off x="12466320" y="5622520"/>
+            <a:ext cx="883920" cy="1040"/>
           </a:xfrm>
           <a:prstGeom prst="straightConnector1">
             <a:avLst/>
@@ -5870,7 +4254,7 @@
         </p:nvSpPr>
         <p:spPr bwMode="auto">
           <a:xfrm>
-            <a:off x="6275163" y="7488936"/>
+            <a:off x="7910010" y="7317435"/>
             <a:ext cx="1280160" cy="274320"/>
           </a:xfrm>
           <a:prstGeom prst="rect">
@@ -6005,7 +4389,7 @@
           <a:p>
             <a:pPr algn="ctr" eaLnBrk="1" hangingPunct="1"/>
             <a:r>
-              <a:rPr lang="en-US" altLang="en-US" sz="1100" dirty="0">
+              <a:rPr lang="en-US" altLang="en-US" sz="1200" dirty="0">
                 <a:latin typeface="Arial" panose="020B0604020202020204" pitchFamily="34" charset="0"/>
                 <a:ea typeface="Amazon Ember" panose="020B0603020204020204" pitchFamily="34" charset="0"/>
                 <a:cs typeface="Arial" panose="020B0604020202020204" pitchFamily="34" charset="0"/>
@@ -6031,8 +4415,8 @@
         </p:nvSpPr>
         <p:spPr bwMode="auto">
           <a:xfrm>
-            <a:off x="6092230" y="5927537"/>
-            <a:ext cx="1645920" cy="457200"/>
+            <a:off x="7575365" y="5856050"/>
+            <a:ext cx="1949449" cy="461665"/>
           </a:xfrm>
           <a:prstGeom prst="rect">
             <a:avLst/>
@@ -6171,7 +4555,7 @@
               <a:buSzPts val="800"/>
             </a:pPr>
             <a:r>
-              <a:rPr lang="en-US" sz="1100" dirty="0">
+              <a:rPr lang="en-US" sz="1200" dirty="0">
                 <a:latin typeface="Arial" panose="020B0604020202020204" pitchFamily="34" charset="0"/>
                 <a:ea typeface="Arial"/>
                 <a:cs typeface="Arial" panose="020B0604020202020204" pitchFamily="34" charset="0"/>
@@ -6180,7 +4564,7 @@
               <a:t>External functions </a:t>
             </a:r>
             <a:br>
-              <a:rPr lang="en-US" sz="1100" dirty="0">
+              <a:rPr lang="en-US" sz="1200" dirty="0">
                 <a:latin typeface="Arial" panose="020B0604020202020204" pitchFamily="34" charset="0"/>
                 <a:ea typeface="Arial"/>
                 <a:cs typeface="Arial" panose="020B0604020202020204" pitchFamily="34" charset="0"/>
@@ -6188,7 +4572,7 @@
               </a:rPr>
             </a:br>
             <a:r>
-              <a:rPr lang="en-US" sz="1100" dirty="0">
+              <a:rPr lang="en-US" sz="1200" dirty="0">
                 <a:latin typeface="Arial" panose="020B0604020202020204" pitchFamily="34" charset="0"/>
                 <a:ea typeface="Arial"/>
                 <a:cs typeface="Arial" panose="020B0604020202020204" pitchFamily="34" charset="0"/>
@@ -6197,14 +4581,14 @@
               <a:t>and</a:t>
             </a:r>
             <a:r>
-              <a:rPr lang="en-US" sz="1100" dirty="0">
+              <a:rPr lang="en-US" sz="1200" dirty="0">
                 <a:latin typeface="Arial" panose="020B0604020202020204" pitchFamily="34" charset="0"/>
                 <a:cs typeface="Arial" panose="020B0604020202020204" pitchFamily="34" charset="0"/>
               </a:rPr>
               <a:t> </a:t>
             </a:r>
             <a:r>
-              <a:rPr lang="en-US" sz="1100" dirty="0">
+              <a:rPr lang="en-US" sz="1200" dirty="0">
                 <a:latin typeface="Arial" panose="020B0604020202020204" pitchFamily="34" charset="0"/>
                 <a:ea typeface="Arial"/>
                 <a:cs typeface="Arial" panose="020B0604020202020204" pitchFamily="34" charset="0"/>
@@ -6213,14 +4597,14 @@
               <a:t>custom </a:t>
             </a:r>
             <a:r>
-              <a:rPr lang="en-US" sz="1100" dirty="0">
+              <a:rPr lang="en-US" sz="1200" dirty="0">
                 <a:latin typeface="Arial" panose="020B0604020202020204" pitchFamily="34" charset="0"/>
                 <a:cs typeface="Arial" panose="020B0604020202020204" pitchFamily="34" charset="0"/>
               </a:rPr>
               <a:t>s</a:t>
             </a:r>
             <a:r>
-              <a:rPr lang="en-US" sz="1100" dirty="0">
+              <a:rPr lang="en-US" sz="1200" dirty="0">
                 <a:latin typeface="Arial" panose="020B0604020202020204" pitchFamily="34" charset="0"/>
                 <a:ea typeface="Arial"/>
                 <a:cs typeface="Arial" panose="020B0604020202020204" pitchFamily="34" charset="0"/>
@@ -6231,6 +4615,908 @@
           </a:p>
         </p:txBody>
       </p:sp>
+      <p:sp>
+        <p:nvSpPr>
+          <p:cNvPr id="35" name="TextBox 19">
+            <a:extLst>
+              <a:ext uri="{FF2B5EF4-FFF2-40B4-BE49-F238E27FC236}">
+                <a16:creationId xmlns:a16="http://schemas.microsoft.com/office/drawing/2014/main" id="{24B231AD-7A80-43DB-B683-2B7FEFBC4B5A}"/>
+              </a:ext>
+            </a:extLst>
+          </p:cNvPr>
+          <p:cNvSpPr txBox="1">
+            <a:spLocks noChangeArrowheads="1"/>
+          </p:cNvSpPr>
+          <p:nvPr/>
+        </p:nvSpPr>
+        <p:spPr bwMode="auto">
+          <a:xfrm>
+            <a:off x="5071719" y="2138296"/>
+            <a:ext cx="12388033" cy="1538883"/>
+          </a:xfrm>
+          <a:prstGeom prst="rect">
+            <a:avLst/>
+          </a:prstGeom>
+          <a:noFill/>
+          <a:ln>
+            <a:noFill/>
+          </a:ln>
+          <a:extLst>
+            <a:ext uri="{909E8E84-426E-40DD-AFC4-6F175D3DCCD1}">
+              <a14:hiddenFill xmlns:a14="http://schemas.microsoft.com/office/drawing/2010/main">
+                <a:solidFill>
+                  <a:srgbClr val="FFFFFF"/>
+                </a:solidFill>
+              </a14:hiddenFill>
+            </a:ext>
+            <a:ext uri="{91240B29-F687-4F45-9708-019B960494DF}">
+              <a14:hiddenLine xmlns:a14="http://schemas.microsoft.com/office/drawing/2010/main" w="9525">
+                <a:solidFill>
+                  <a:srgbClr val="000000"/>
+                </a:solidFill>
+                <a:miter lim="800000"/>
+                <a:headEnd/>
+                <a:tailEnd/>
+              </a14:hiddenLine>
+            </a:ext>
+          </a:extLst>
+        </p:spPr>
+        <p:txBody>
+          <a:bodyPr wrap="square">
+            <a:spAutoFit/>
+          </a:bodyPr>
+          <a:lstStyle>
+            <a:lvl1pPr>
+              <a:defRPr>
+                <a:solidFill>
+                  <a:schemeClr val="tx1"/>
+                </a:solidFill>
+                <a:latin typeface="Calibri" panose="020F0502020204030204" pitchFamily="34" charset="0"/>
+              </a:defRPr>
+            </a:lvl1pPr>
+            <a:lvl2pPr marL="742950" indent="-285750">
+              <a:defRPr>
+                <a:solidFill>
+                  <a:schemeClr val="tx1"/>
+                </a:solidFill>
+                <a:latin typeface="Calibri" panose="020F0502020204030204" pitchFamily="34" charset="0"/>
+              </a:defRPr>
+            </a:lvl2pPr>
+            <a:lvl3pPr marL="1143000" indent="-228600">
+              <a:defRPr>
+                <a:solidFill>
+                  <a:schemeClr val="tx1"/>
+                </a:solidFill>
+                <a:latin typeface="Calibri" panose="020F0502020204030204" pitchFamily="34" charset="0"/>
+              </a:defRPr>
+            </a:lvl3pPr>
+            <a:lvl4pPr marL="1600200" indent="-228600">
+              <a:defRPr>
+                <a:solidFill>
+                  <a:schemeClr val="tx1"/>
+                </a:solidFill>
+                <a:latin typeface="Calibri" panose="020F0502020204030204" pitchFamily="34" charset="0"/>
+              </a:defRPr>
+            </a:lvl4pPr>
+            <a:lvl5pPr marL="2057400" indent="-228600">
+              <a:defRPr>
+                <a:solidFill>
+                  <a:schemeClr val="tx1"/>
+                </a:solidFill>
+                <a:latin typeface="Calibri" panose="020F0502020204030204" pitchFamily="34" charset="0"/>
+              </a:defRPr>
+            </a:lvl5pPr>
+            <a:lvl6pPr marL="2514600" indent="-228600" eaLnBrk="0" fontAlgn="base" hangingPunct="0">
+              <a:spcBef>
+                <a:spcPct val="0"/>
+              </a:spcBef>
+              <a:spcAft>
+                <a:spcPct val="0"/>
+              </a:spcAft>
+              <a:defRPr>
+                <a:solidFill>
+                  <a:schemeClr val="tx1"/>
+                </a:solidFill>
+                <a:latin typeface="Calibri" panose="020F0502020204030204" pitchFamily="34" charset="0"/>
+              </a:defRPr>
+            </a:lvl6pPr>
+            <a:lvl7pPr marL="2971800" indent="-228600" eaLnBrk="0" fontAlgn="base" hangingPunct="0">
+              <a:spcBef>
+                <a:spcPct val="0"/>
+              </a:spcBef>
+              <a:spcAft>
+                <a:spcPct val="0"/>
+              </a:spcAft>
+              <a:defRPr>
+                <a:solidFill>
+                  <a:schemeClr val="tx1"/>
+                </a:solidFill>
+                <a:latin typeface="Calibri" panose="020F0502020204030204" pitchFamily="34" charset="0"/>
+              </a:defRPr>
+            </a:lvl7pPr>
+            <a:lvl8pPr marL="3429000" indent="-228600" eaLnBrk="0" fontAlgn="base" hangingPunct="0">
+              <a:spcBef>
+                <a:spcPct val="0"/>
+              </a:spcBef>
+              <a:spcAft>
+                <a:spcPct val="0"/>
+              </a:spcAft>
+              <a:defRPr>
+                <a:solidFill>
+                  <a:schemeClr val="tx1"/>
+                </a:solidFill>
+                <a:latin typeface="Calibri" panose="020F0502020204030204" pitchFamily="34" charset="0"/>
+              </a:defRPr>
+            </a:lvl8pPr>
+            <a:lvl9pPr marL="3886200" indent="-228600" eaLnBrk="0" fontAlgn="base" hangingPunct="0">
+              <a:spcBef>
+                <a:spcPct val="0"/>
+              </a:spcBef>
+              <a:spcAft>
+                <a:spcPct val="0"/>
+              </a:spcAft>
+              <a:defRPr>
+                <a:solidFill>
+                  <a:schemeClr val="tx1"/>
+                </a:solidFill>
+                <a:latin typeface="Calibri" panose="020F0502020204030204" pitchFamily="34" charset="0"/>
+              </a:defRPr>
+            </a:lvl9pPr>
+          </a:lstStyle>
+          <a:p>
+            <a:pPr algn="ctr" eaLnBrk="1" hangingPunct="1"/>
+            <a:r>
+              <a:rPr lang="en-US" altLang="en-US" sz="2000" b="1" dirty="0">
+                <a:latin typeface="Arial" panose="020B0604020202020204" pitchFamily="34" charset="0"/>
+                <a:ea typeface="Amazon Ember" panose="020B0603020204020204" pitchFamily="34" charset="0"/>
+                <a:cs typeface="Arial" panose="020B0604020202020204" pitchFamily="34" charset="0"/>
+              </a:rPr>
+              <a:t>Example serverless architecture</a:t>
+            </a:r>
+          </a:p>
+          <a:p>
+            <a:pPr algn="ctr" eaLnBrk="1" hangingPunct="1"/>
+            <a:r>
+              <a:rPr lang="en-US" altLang="en-US" sz="1800" dirty="0">
+                <a:latin typeface="Arial" panose="020B0604020202020204" pitchFamily="34" charset="0"/>
+                <a:ea typeface="Amazon Ember" panose="020B0603020204020204" pitchFamily="34" charset="0"/>
+                <a:cs typeface="Arial" panose="020B0604020202020204" pitchFamily="34" charset="0"/>
+              </a:rPr>
+              <a:t>Updated 4/17/2023</a:t>
+            </a:r>
+            <a:br>
+              <a:rPr lang="en-US" altLang="en-US" sz="2000" dirty="0">
+                <a:latin typeface="Arial" panose="020B0604020202020204" pitchFamily="34" charset="0"/>
+                <a:ea typeface="Amazon Ember" panose="020B0603020204020204" pitchFamily="34" charset="0"/>
+                <a:cs typeface="Arial" panose="020B0604020202020204" pitchFamily="34" charset="0"/>
+              </a:rPr>
+            </a:br>
+            <a:br>
+              <a:rPr lang="en-US" altLang="en-US" sz="2000" dirty="0">
+                <a:latin typeface="Arial" panose="020B0604020202020204" pitchFamily="34" charset="0"/>
+                <a:ea typeface="Amazon Ember" panose="020B0603020204020204" pitchFamily="34" charset="0"/>
+                <a:cs typeface="Arial" panose="020B0604020202020204" pitchFamily="34" charset="0"/>
+              </a:rPr>
+            </a:br>
+            <a:r>
+              <a:rPr lang="en-US" altLang="en-US" sz="1800" dirty="0">
+                <a:latin typeface="Arial" panose="020B0604020202020204" pitchFamily="34" charset="0"/>
+                <a:ea typeface="Amazon Ember" panose="020B0603020204020204" pitchFamily="34" charset="0"/>
+                <a:cs typeface="Arial" panose="020B0604020202020204" pitchFamily="34" charset="0"/>
+              </a:rPr>
+              <a:t>For your diagrams, download the latest PowerPoint deck (“toolkit”) from the </a:t>
+            </a:r>
+            <a:r>
+              <a:rPr lang="en-US" altLang="en-US" sz="1800" dirty="0">
+                <a:latin typeface="Arial" panose="020B0604020202020204" pitchFamily="34" charset="0"/>
+                <a:ea typeface="Amazon Ember" panose="020B0603020204020204" pitchFamily="34" charset="0"/>
+                <a:cs typeface="Arial" panose="020B0604020202020204" pitchFamily="34" charset="0"/>
+                <a:hlinkClick r:id="rId2"/>
+              </a:rPr>
+              <a:t>AWS Architecture Icons</a:t>
+            </a:r>
+            <a:r>
+              <a:rPr lang="en-US" altLang="en-US" sz="1800" dirty="0">
+                <a:latin typeface="Arial" panose="020B0604020202020204" pitchFamily="34" charset="0"/>
+                <a:ea typeface="Amazon Ember" panose="020B0603020204020204" pitchFamily="34" charset="0"/>
+                <a:cs typeface="Arial" panose="020B0604020202020204" pitchFamily="34" charset="0"/>
+              </a:rPr>
+              <a:t> page. </a:t>
+            </a:r>
+            <a:br>
+              <a:rPr lang="en-US" altLang="en-US" sz="1800" dirty="0">
+                <a:latin typeface="Arial" panose="020B0604020202020204" pitchFamily="34" charset="0"/>
+                <a:ea typeface="Amazon Ember" panose="020B0603020204020204" pitchFamily="34" charset="0"/>
+                <a:cs typeface="Arial" panose="020B0604020202020204" pitchFamily="34" charset="0"/>
+              </a:rPr>
+            </a:br>
+            <a:r>
+              <a:rPr lang="en-US" altLang="en-US" sz="1800" dirty="0">
+                <a:latin typeface="Arial" panose="020B0604020202020204" pitchFamily="34" charset="0"/>
+                <a:ea typeface="Amazon Ember" panose="020B0603020204020204" pitchFamily="34" charset="0"/>
+                <a:cs typeface="Arial" panose="020B0604020202020204" pitchFamily="34" charset="0"/>
+              </a:rPr>
+              <a:t>Use only the elements in that deck, which is updated quarterly.</a:t>
+            </a:r>
+            <a:endParaRPr lang="en-US" altLang="en-US" sz="2000" dirty="0">
+              <a:latin typeface="Arial" panose="020B0604020202020204" pitchFamily="34" charset="0"/>
+              <a:ea typeface="Amazon Ember" panose="020B0603020204020204" pitchFamily="34" charset="0"/>
+              <a:cs typeface="Arial" panose="020B0604020202020204" pitchFamily="34" charset="0"/>
+            </a:endParaRPr>
+          </a:p>
+        </p:txBody>
+      </p:sp>
+      <p:sp>
+        <p:nvSpPr>
+          <p:cNvPr id="38" name="Rectangle 37">
+            <a:extLst>
+              <a:ext uri="{FF2B5EF4-FFF2-40B4-BE49-F238E27FC236}">
+                <a16:creationId xmlns:a16="http://schemas.microsoft.com/office/drawing/2014/main" id="{7CB08663-D710-4053-A3E1-2B17AE6336E1}"/>
+              </a:ext>
+            </a:extLst>
+          </p:cNvPr>
+          <p:cNvSpPr/>
+          <p:nvPr/>
+        </p:nvSpPr>
+        <p:spPr bwMode="auto">
+          <a:xfrm>
+            <a:off x="9784080" y="4937760"/>
+            <a:ext cx="4297680" cy="2834640"/>
+          </a:xfrm>
+          <a:prstGeom prst="rect">
+            <a:avLst/>
+          </a:prstGeom>
+          <a:noFill/>
+          <a:ln w="15875">
+            <a:solidFill>
+              <a:schemeClr val="tx1"/>
+            </a:solidFill>
+          </a:ln>
+        </p:spPr>
+        <p:style>
+          <a:lnRef idx="2">
+            <a:schemeClr val="accent1">
+              <a:shade val="50000"/>
+            </a:schemeClr>
+          </a:lnRef>
+          <a:fillRef idx="1">
+            <a:schemeClr val="accent1"/>
+          </a:fillRef>
+          <a:effectRef idx="0">
+            <a:schemeClr val="accent1"/>
+          </a:effectRef>
+          <a:fontRef idx="minor">
+            <a:schemeClr val="lt1"/>
+          </a:fontRef>
+        </p:style>
+        <p:txBody>
+          <a:bodyPr lIns="502920" tIns="91440"/>
+          <a:lstStyle/>
+          <a:p>
+            <a:pPr eaLnBrk="1" fontAlgn="auto" hangingPunct="1">
+              <a:spcBef>
+                <a:spcPts val="0"/>
+              </a:spcBef>
+              <a:spcAft>
+                <a:spcPts val="0"/>
+              </a:spcAft>
+              <a:defRPr/>
+            </a:pPr>
+            <a:r>
+              <a:rPr lang="en-US" sz="1200" dirty="0">
+                <a:solidFill>
+                  <a:schemeClr val="tx1"/>
+                </a:solidFill>
+                <a:latin typeface="Arial" panose="020B0604020202020204" pitchFamily="34" charset="0"/>
+                <a:cs typeface="Arial" panose="020B0604020202020204" pitchFamily="34" charset="0"/>
+              </a:rPr>
+              <a:t>AWS Cloud</a:t>
+            </a:r>
+          </a:p>
+        </p:txBody>
+      </p:sp>
+      <p:pic>
+        <p:nvPicPr>
+          <p:cNvPr id="39" name="Graphic 38">
+            <a:extLst>
+              <a:ext uri="{FF2B5EF4-FFF2-40B4-BE49-F238E27FC236}">
+                <a16:creationId xmlns:a16="http://schemas.microsoft.com/office/drawing/2014/main" id="{22797773-BCD7-4DE2-BE09-E58ED86A9EE7}"/>
+              </a:ext>
+            </a:extLst>
+          </p:cNvPr>
+          <p:cNvPicPr>
+            <a:picLocks noChangeAspect="1"/>
+          </p:cNvPicPr>
+          <p:nvPr/>
+        </p:nvPicPr>
+        <p:blipFill>
+          <a:blip r:embed="rId3">
+            <a:extLst>
+              <a:ext uri="{96DAC541-7B7A-43D3-8B79-37D633B846F1}">
+                <asvg:svgBlip xmlns:asvg="http://schemas.microsoft.com/office/drawing/2016/SVG/main" r:embed="rId4"/>
+              </a:ext>
+            </a:extLst>
+          </a:blip>
+          <a:srcRect/>
+          <a:stretch/>
+        </p:blipFill>
+        <p:spPr>
+          <a:xfrm>
+            <a:off x="9784080" y="4937760"/>
+            <a:ext cx="381000" cy="381000"/>
+          </a:xfrm>
+          <a:prstGeom prst="rect">
+            <a:avLst/>
+          </a:prstGeom>
+        </p:spPr>
+      </p:pic>
+      <p:pic>
+        <p:nvPicPr>
+          <p:cNvPr id="41" name="Graphic 22">
+            <a:extLst>
+              <a:ext uri="{FF2B5EF4-FFF2-40B4-BE49-F238E27FC236}">
+                <a16:creationId xmlns:a16="http://schemas.microsoft.com/office/drawing/2014/main" id="{D84115EE-4E38-4984-B0DE-F575FE01D8FE}"/>
+              </a:ext>
+            </a:extLst>
+          </p:cNvPr>
+          <p:cNvPicPr>
+            <a:picLocks noChangeAspect="1" noChangeArrowheads="1"/>
+          </p:cNvPicPr>
+          <p:nvPr/>
+        </p:nvPicPr>
+        <p:blipFill>
+          <a:blip r:embed="rId5">
+            <a:extLst>
+              <a:ext uri="{96DAC541-7B7A-43D3-8B79-37D633B846F1}">
+                <asvg:svgBlip xmlns:asvg="http://schemas.microsoft.com/office/drawing/2016/SVG/main" r:embed="rId6"/>
+              </a:ext>
+            </a:extLst>
+          </a:blip>
+          <a:srcRect/>
+          <a:stretch/>
+        </p:blipFill>
+        <p:spPr bwMode="auto">
+          <a:xfrm>
+            <a:off x="11704320" y="5241520"/>
+            <a:ext cx="762000" cy="762000"/>
+          </a:xfrm>
+          <a:prstGeom prst="rect">
+            <a:avLst/>
+          </a:prstGeom>
+          <a:noFill/>
+          <a:ln>
+            <a:noFill/>
+          </a:ln>
+          <a:extLst>
+            <a:ext uri="{909E8E84-426E-40DD-AFC4-6F175D3DCCD1}">
+              <a14:hiddenFill xmlns:a14="http://schemas.microsoft.com/office/drawing/2010/main">
+                <a:solidFill>
+                  <a:srgbClr val="FFFFFF"/>
+                </a:solidFill>
+              </a14:hiddenFill>
+            </a:ext>
+            <a:ext uri="{91240B29-F687-4F45-9708-019B960494DF}">
+              <a14:hiddenLine xmlns:a14="http://schemas.microsoft.com/office/drawing/2010/main" w="9525">
+                <a:solidFill>
+                  <a:srgbClr val="000000"/>
+                </a:solidFill>
+                <a:miter lim="800000"/>
+                <a:headEnd/>
+                <a:tailEnd/>
+              </a14:hiddenLine>
+            </a:ext>
+          </a:extLst>
+        </p:spPr>
+      </p:pic>
+      <p:pic>
+        <p:nvPicPr>
+          <p:cNvPr id="43" name="Graphic 6">
+            <a:extLst>
+              <a:ext uri="{FF2B5EF4-FFF2-40B4-BE49-F238E27FC236}">
+                <a16:creationId xmlns:a16="http://schemas.microsoft.com/office/drawing/2014/main" id="{F80FD03B-CAD7-4B76-BC84-9054489A319E}"/>
+              </a:ext>
+            </a:extLst>
+          </p:cNvPr>
+          <p:cNvPicPr>
+            <a:picLocks noChangeAspect="1" noChangeArrowheads="1"/>
+          </p:cNvPicPr>
+          <p:nvPr/>
+        </p:nvPicPr>
+        <p:blipFill>
+          <a:blip r:embed="rId7">
+            <a:extLst>
+              <a:ext uri="{96DAC541-7B7A-43D3-8B79-37D633B846F1}">
+                <asvg:svgBlip xmlns:asvg="http://schemas.microsoft.com/office/drawing/2016/SVG/main" r:embed="rId8"/>
+              </a:ext>
+            </a:extLst>
+          </a:blip>
+          <a:srcRect/>
+          <a:stretch/>
+        </p:blipFill>
+        <p:spPr bwMode="auto">
+          <a:xfrm>
+            <a:off x="10424160" y="5394960"/>
+            <a:ext cx="457200" cy="457200"/>
+          </a:xfrm>
+          <a:prstGeom prst="rect">
+            <a:avLst/>
+          </a:prstGeom>
+          <a:noFill/>
+          <a:ln>
+            <a:noFill/>
+          </a:ln>
+          <a:extLst>
+            <a:ext uri="{909E8E84-426E-40DD-AFC4-6F175D3DCCD1}">
+              <a14:hiddenFill xmlns:a14="http://schemas.microsoft.com/office/drawing/2010/main">
+                <a:solidFill>
+                  <a:srgbClr val="FFFFFF"/>
+                </a:solidFill>
+              </a14:hiddenFill>
+            </a:ext>
+            <a:ext uri="{91240B29-F687-4F45-9708-019B960494DF}">
+              <a14:hiddenLine xmlns:a14="http://schemas.microsoft.com/office/drawing/2010/main" w="9525">
+                <a:solidFill>
+                  <a:srgbClr val="000000"/>
+                </a:solidFill>
+                <a:miter lim="800000"/>
+                <a:headEnd/>
+                <a:tailEnd/>
+              </a14:hiddenLine>
+            </a:ext>
+          </a:extLst>
+        </p:spPr>
+      </p:pic>
+      <p:pic>
+        <p:nvPicPr>
+          <p:cNvPr id="45" name="Graphic 44">
+            <a:extLst>
+              <a:ext uri="{FF2B5EF4-FFF2-40B4-BE49-F238E27FC236}">
+                <a16:creationId xmlns:a16="http://schemas.microsoft.com/office/drawing/2014/main" id="{DCAD3215-735E-48A2-9ECF-0E038F2985C7}"/>
+              </a:ext>
+            </a:extLst>
+          </p:cNvPr>
+          <p:cNvPicPr>
+            <a:picLocks noChangeAspect="1"/>
+          </p:cNvPicPr>
+          <p:nvPr/>
+        </p:nvPicPr>
+        <p:blipFill>
+          <a:blip r:embed="rId9">
+            <a:extLst>
+              <a:ext uri="{96DAC541-7B7A-43D3-8B79-37D633B846F1}">
+                <asvg:svgBlip xmlns:asvg="http://schemas.microsoft.com/office/drawing/2016/SVG/main" r:embed="rId10"/>
+              </a:ext>
+            </a:extLst>
+          </a:blip>
+          <a:stretch>
+            <a:fillRect/>
+          </a:stretch>
+        </p:blipFill>
+        <p:spPr>
+          <a:xfrm>
+            <a:off x="13350240" y="5394960"/>
+            <a:ext cx="457200" cy="457200"/>
+          </a:xfrm>
+          <a:prstGeom prst="rect">
+            <a:avLst/>
+          </a:prstGeom>
+        </p:spPr>
+      </p:pic>
+      <p:sp>
+        <p:nvSpPr>
+          <p:cNvPr id="48" name="TextBox 17">
+            <a:extLst>
+              <a:ext uri="{FF2B5EF4-FFF2-40B4-BE49-F238E27FC236}">
+                <a16:creationId xmlns:a16="http://schemas.microsoft.com/office/drawing/2014/main" id="{8318EF71-7B70-4992-A2F0-2F487D7C8D4D}"/>
+              </a:ext>
+            </a:extLst>
+          </p:cNvPr>
+          <p:cNvSpPr txBox="1">
+            <a:spLocks noChangeArrowheads="1"/>
+          </p:cNvSpPr>
+          <p:nvPr/>
+        </p:nvSpPr>
+        <p:spPr bwMode="auto">
+          <a:xfrm>
+            <a:off x="9971191" y="7318476"/>
+            <a:ext cx="1362074" cy="276999"/>
+          </a:xfrm>
+          <a:prstGeom prst="rect">
+            <a:avLst/>
+          </a:prstGeom>
+          <a:noFill/>
+          <a:ln>
+            <a:noFill/>
+          </a:ln>
+          <a:extLst>
+            <a:ext uri="{909E8E84-426E-40DD-AFC4-6F175D3DCCD1}">
+              <a14:hiddenFill xmlns:a14="http://schemas.microsoft.com/office/drawing/2010/main">
+                <a:solidFill>
+                  <a:srgbClr val="FFFFFF"/>
+                </a:solidFill>
+              </a14:hiddenFill>
+            </a:ext>
+            <a:ext uri="{91240B29-F687-4F45-9708-019B960494DF}">
+              <a14:hiddenLine xmlns:a14="http://schemas.microsoft.com/office/drawing/2010/main" w="9525">
+                <a:solidFill>
+                  <a:srgbClr val="000000"/>
+                </a:solidFill>
+                <a:miter lim="800000"/>
+                <a:headEnd/>
+                <a:tailEnd/>
+              </a14:hiddenLine>
+            </a:ext>
+          </a:extLst>
+        </p:spPr>
+        <p:txBody>
+          <a:bodyPr wrap="square">
+            <a:spAutoFit/>
+          </a:bodyPr>
+          <a:lstStyle>
+            <a:lvl1pPr>
+              <a:defRPr>
+                <a:solidFill>
+                  <a:schemeClr val="tx1"/>
+                </a:solidFill>
+                <a:latin typeface="Calibri" panose="020F0502020204030204" pitchFamily="34" charset="0"/>
+              </a:defRPr>
+            </a:lvl1pPr>
+            <a:lvl2pPr marL="742950" indent="-285750">
+              <a:defRPr>
+                <a:solidFill>
+                  <a:schemeClr val="tx1"/>
+                </a:solidFill>
+                <a:latin typeface="Calibri" panose="020F0502020204030204" pitchFamily="34" charset="0"/>
+              </a:defRPr>
+            </a:lvl2pPr>
+            <a:lvl3pPr marL="1143000" indent="-228600">
+              <a:defRPr>
+                <a:solidFill>
+                  <a:schemeClr val="tx1"/>
+                </a:solidFill>
+                <a:latin typeface="Calibri" panose="020F0502020204030204" pitchFamily="34" charset="0"/>
+              </a:defRPr>
+            </a:lvl3pPr>
+            <a:lvl4pPr marL="1600200" indent="-228600">
+              <a:defRPr>
+                <a:solidFill>
+                  <a:schemeClr val="tx1"/>
+                </a:solidFill>
+                <a:latin typeface="Calibri" panose="020F0502020204030204" pitchFamily="34" charset="0"/>
+              </a:defRPr>
+            </a:lvl4pPr>
+            <a:lvl5pPr marL="2057400" indent="-228600">
+              <a:defRPr>
+                <a:solidFill>
+                  <a:schemeClr val="tx1"/>
+                </a:solidFill>
+                <a:latin typeface="Calibri" panose="020F0502020204030204" pitchFamily="34" charset="0"/>
+              </a:defRPr>
+            </a:lvl5pPr>
+            <a:lvl6pPr marL="2514600" indent="-228600" eaLnBrk="0" fontAlgn="base" hangingPunct="0">
+              <a:spcBef>
+                <a:spcPct val="0"/>
+              </a:spcBef>
+              <a:spcAft>
+                <a:spcPct val="0"/>
+              </a:spcAft>
+              <a:defRPr>
+                <a:solidFill>
+                  <a:schemeClr val="tx1"/>
+                </a:solidFill>
+                <a:latin typeface="Calibri" panose="020F0502020204030204" pitchFamily="34" charset="0"/>
+              </a:defRPr>
+            </a:lvl6pPr>
+            <a:lvl7pPr marL="2971800" indent="-228600" eaLnBrk="0" fontAlgn="base" hangingPunct="0">
+              <a:spcBef>
+                <a:spcPct val="0"/>
+              </a:spcBef>
+              <a:spcAft>
+                <a:spcPct val="0"/>
+              </a:spcAft>
+              <a:defRPr>
+                <a:solidFill>
+                  <a:schemeClr val="tx1"/>
+                </a:solidFill>
+                <a:latin typeface="Calibri" panose="020F0502020204030204" pitchFamily="34" charset="0"/>
+              </a:defRPr>
+            </a:lvl7pPr>
+            <a:lvl8pPr marL="3429000" indent="-228600" eaLnBrk="0" fontAlgn="base" hangingPunct="0">
+              <a:spcBef>
+                <a:spcPct val="0"/>
+              </a:spcBef>
+              <a:spcAft>
+                <a:spcPct val="0"/>
+              </a:spcAft>
+              <a:defRPr>
+                <a:solidFill>
+                  <a:schemeClr val="tx1"/>
+                </a:solidFill>
+                <a:latin typeface="Calibri" panose="020F0502020204030204" pitchFamily="34" charset="0"/>
+              </a:defRPr>
+            </a:lvl8pPr>
+            <a:lvl9pPr marL="3886200" indent="-228600" eaLnBrk="0" fontAlgn="base" hangingPunct="0">
+              <a:spcBef>
+                <a:spcPct val="0"/>
+              </a:spcBef>
+              <a:spcAft>
+                <a:spcPct val="0"/>
+              </a:spcAft>
+              <a:defRPr>
+                <a:solidFill>
+                  <a:schemeClr val="tx1"/>
+                </a:solidFill>
+                <a:latin typeface="Calibri" panose="020F0502020204030204" pitchFamily="34" charset="0"/>
+              </a:defRPr>
+            </a:lvl9pPr>
+          </a:lstStyle>
+          <a:p>
+            <a:pPr algn="ctr" eaLnBrk="1" hangingPunct="1"/>
+            <a:r>
+              <a:rPr lang="en-US" altLang="en-US" sz="1200" dirty="0">
+                <a:latin typeface="Arial" panose="020B0604020202020204" pitchFamily="34" charset="0"/>
+                <a:ea typeface="Amazon Ember" panose="020B0603020204020204" pitchFamily="34" charset="0"/>
+                <a:cs typeface="Arial" panose="020B0604020202020204" pitchFamily="34" charset="0"/>
+              </a:rPr>
+              <a:t>Lambda function</a:t>
+            </a:r>
+          </a:p>
+        </p:txBody>
+      </p:sp>
+      <p:pic>
+        <p:nvPicPr>
+          <p:cNvPr id="49" name="Graphic 13">
+            <a:extLst>
+              <a:ext uri="{FF2B5EF4-FFF2-40B4-BE49-F238E27FC236}">
+                <a16:creationId xmlns:a16="http://schemas.microsoft.com/office/drawing/2014/main" id="{5A08A8AE-6770-4D9F-A22C-D6656DE458BF}"/>
+              </a:ext>
+            </a:extLst>
+          </p:cNvPr>
+          <p:cNvPicPr>
+            <a:picLocks noChangeAspect="1" noChangeArrowheads="1"/>
+          </p:cNvPicPr>
+          <p:nvPr/>
+        </p:nvPicPr>
+        <p:blipFill>
+          <a:blip r:embed="rId11">
+            <a:extLst>
+              <a:ext uri="{96DAC541-7B7A-43D3-8B79-37D633B846F1}">
+                <asvg:svgBlip xmlns:asvg="http://schemas.microsoft.com/office/drawing/2016/SVG/main" r:embed="rId12"/>
+              </a:ext>
+            </a:extLst>
+          </a:blip>
+          <a:srcRect/>
+          <a:stretch/>
+        </p:blipFill>
+        <p:spPr bwMode="auto">
+          <a:xfrm>
+            <a:off x="10424160" y="6858000"/>
+            <a:ext cx="457200" cy="457200"/>
+          </a:xfrm>
+          <a:prstGeom prst="rect">
+            <a:avLst/>
+          </a:prstGeom>
+          <a:noFill/>
+          <a:ln>
+            <a:noFill/>
+          </a:ln>
+          <a:extLst>
+            <a:ext uri="{909E8E84-426E-40DD-AFC4-6F175D3DCCD1}">
+              <a14:hiddenFill xmlns:a14="http://schemas.microsoft.com/office/drawing/2010/main">
+                <a:solidFill>
+                  <a:srgbClr val="FFFFFF"/>
+                </a:solidFill>
+              </a14:hiddenFill>
+            </a:ext>
+            <a:ext uri="{91240B29-F687-4F45-9708-019B960494DF}">
+              <a14:hiddenLine xmlns:a14="http://schemas.microsoft.com/office/drawing/2010/main" w="9525">
+                <a:solidFill>
+                  <a:srgbClr val="000000"/>
+                </a:solidFill>
+                <a:miter lim="800000"/>
+                <a:headEnd/>
+                <a:tailEnd/>
+              </a14:hiddenLine>
+            </a:ext>
+          </a:extLst>
+        </p:spPr>
+      </p:pic>
+      <p:sp>
+        <p:nvSpPr>
+          <p:cNvPr id="52" name="Rectangle 51">
+            <a:extLst>
+              <a:ext uri="{FF2B5EF4-FFF2-40B4-BE49-F238E27FC236}">
+                <a16:creationId xmlns:a16="http://schemas.microsoft.com/office/drawing/2014/main" id="{8CF718E6-1F57-4854-84BF-11282968AFB8}"/>
+              </a:ext>
+            </a:extLst>
+          </p:cNvPr>
+          <p:cNvSpPr/>
+          <p:nvPr/>
+        </p:nvSpPr>
+        <p:spPr>
+          <a:xfrm>
+            <a:off x="7680960" y="4937760"/>
+            <a:ext cx="1737360" cy="2834640"/>
+          </a:xfrm>
+          <a:prstGeom prst="rect">
+            <a:avLst/>
+          </a:prstGeom>
+          <a:noFill/>
+          <a:ln w="15875">
+            <a:solidFill>
+              <a:srgbClr val="7D8998"/>
+            </a:solidFill>
+            <a:prstDash val="dash"/>
+          </a:ln>
+        </p:spPr>
+        <p:style>
+          <a:lnRef idx="2">
+            <a:schemeClr val="accent1">
+              <a:shade val="50000"/>
+            </a:schemeClr>
+          </a:lnRef>
+          <a:fillRef idx="1">
+            <a:schemeClr val="accent1"/>
+          </a:fillRef>
+          <a:effectRef idx="0">
+            <a:schemeClr val="accent1"/>
+          </a:effectRef>
+          <a:fontRef idx="minor">
+            <a:schemeClr val="lt1"/>
+          </a:fontRef>
+        </p:style>
+        <p:txBody>
+          <a:bodyPr tIns="91440"/>
+          <a:lstStyle/>
+          <a:p>
+            <a:pPr algn="ctr" eaLnBrk="1" fontAlgn="auto" hangingPunct="1">
+              <a:spcBef>
+                <a:spcPts val="0"/>
+              </a:spcBef>
+              <a:spcAft>
+                <a:spcPts val="0"/>
+              </a:spcAft>
+              <a:defRPr/>
+            </a:pPr>
+            <a:r>
+              <a:rPr lang="en-US" sz="1200" dirty="0">
+                <a:solidFill>
+                  <a:srgbClr val="5A6B86"/>
+                </a:solidFill>
+                <a:latin typeface="Arial" panose="020B0604020202020204" pitchFamily="34" charset="0"/>
+                <a:cs typeface="Arial" panose="020B0604020202020204" pitchFamily="34" charset="0"/>
+              </a:rPr>
+              <a:t>      </a:t>
+            </a:r>
+            <a:r>
+              <a:rPr lang="en-US" sz="1200" dirty="0">
+                <a:solidFill>
+                  <a:schemeClr val="tx1"/>
+                </a:solidFill>
+                <a:latin typeface="Arial" panose="020B0604020202020204" pitchFamily="34" charset="0"/>
+                <a:cs typeface="Arial" panose="020B0604020202020204" pitchFamily="34" charset="0"/>
+              </a:rPr>
+              <a:t>Snowflake account</a:t>
+            </a:r>
+          </a:p>
+        </p:txBody>
+      </p:sp>
+      <p:pic>
+        <p:nvPicPr>
+          <p:cNvPr id="54" name="Graphic 16">
+            <a:extLst>
+              <a:ext uri="{FF2B5EF4-FFF2-40B4-BE49-F238E27FC236}">
+                <a16:creationId xmlns:a16="http://schemas.microsoft.com/office/drawing/2014/main" id="{02B1B767-BB54-4846-B577-7DEF0EC2220F}"/>
+              </a:ext>
+            </a:extLst>
+          </p:cNvPr>
+          <p:cNvPicPr>
+            <a:picLocks noChangeAspect="1" noChangeArrowheads="1"/>
+          </p:cNvPicPr>
+          <p:nvPr/>
+        </p:nvPicPr>
+        <p:blipFill>
+          <a:blip r:embed="rId13">
+            <a:extLst>
+              <a:ext uri="{96DAC541-7B7A-43D3-8B79-37D633B846F1}">
+                <asvg:svgBlip xmlns:asvg="http://schemas.microsoft.com/office/drawing/2016/SVG/main" r:embed="rId14"/>
+              </a:ext>
+            </a:extLst>
+          </a:blip>
+          <a:srcRect/>
+          <a:stretch/>
+        </p:blipFill>
+        <p:spPr bwMode="auto">
+          <a:xfrm>
+            <a:off x="8321040" y="5394960"/>
+            <a:ext cx="457200" cy="457200"/>
+          </a:xfrm>
+          <a:prstGeom prst="rect">
+            <a:avLst/>
+          </a:prstGeom>
+          <a:noFill/>
+          <a:ln>
+            <a:noFill/>
+          </a:ln>
+          <a:extLst>
+            <a:ext uri="{909E8E84-426E-40DD-AFC4-6F175D3DCCD1}">
+              <a14:hiddenFill xmlns:a14="http://schemas.microsoft.com/office/drawing/2010/main">
+                <a:solidFill>
+                  <a:srgbClr val="FFFFFF"/>
+                </a:solidFill>
+              </a14:hiddenFill>
+            </a:ext>
+            <a:ext uri="{91240B29-F687-4F45-9708-019B960494DF}">
+              <a14:hiddenLine xmlns:a14="http://schemas.microsoft.com/office/drawing/2010/main" w="9525">
+                <a:solidFill>
+                  <a:srgbClr val="000000"/>
+                </a:solidFill>
+                <a:miter lim="800000"/>
+                <a:headEnd/>
+                <a:tailEnd/>
+              </a14:hiddenLine>
+            </a:ext>
+          </a:extLst>
+        </p:spPr>
+      </p:pic>
+      <p:pic>
+        <p:nvPicPr>
+          <p:cNvPr id="61" name="Graphic 16">
+            <a:extLst>
+              <a:ext uri="{FF2B5EF4-FFF2-40B4-BE49-F238E27FC236}">
+                <a16:creationId xmlns:a16="http://schemas.microsoft.com/office/drawing/2014/main" id="{030FD311-9CD6-40BA-9E76-CB31A93FDE59}"/>
+              </a:ext>
+            </a:extLst>
+          </p:cNvPr>
+          <p:cNvPicPr>
+            <a:picLocks noChangeAspect="1" noChangeArrowheads="1"/>
+          </p:cNvPicPr>
+          <p:nvPr/>
+        </p:nvPicPr>
+        <p:blipFill>
+          <a:blip r:embed="rId13">
+            <a:extLst>
+              <a:ext uri="{96DAC541-7B7A-43D3-8B79-37D633B846F1}">
+                <asvg:svgBlip xmlns:asvg="http://schemas.microsoft.com/office/drawing/2016/SVG/main" r:embed="rId14"/>
+              </a:ext>
+            </a:extLst>
+          </a:blip>
+          <a:srcRect/>
+          <a:stretch/>
+        </p:blipFill>
+        <p:spPr bwMode="auto">
+          <a:xfrm>
+            <a:off x="8321040" y="6858000"/>
+            <a:ext cx="457200" cy="457200"/>
+          </a:xfrm>
+          <a:prstGeom prst="rect">
+            <a:avLst/>
+          </a:prstGeom>
+          <a:noFill/>
+          <a:ln>
+            <a:noFill/>
+          </a:ln>
+          <a:extLst>
+            <a:ext uri="{909E8E84-426E-40DD-AFC4-6F175D3DCCD1}">
+              <a14:hiddenFill xmlns:a14="http://schemas.microsoft.com/office/drawing/2010/main">
+                <a:solidFill>
+                  <a:srgbClr val="FFFFFF"/>
+                </a:solidFill>
+              </a14:hiddenFill>
+            </a:ext>
+            <a:ext uri="{91240B29-F687-4F45-9708-019B960494DF}">
+              <a14:hiddenLine xmlns:a14="http://schemas.microsoft.com/office/drawing/2010/main" w="9525">
+                <a:solidFill>
+                  <a:srgbClr val="000000"/>
+                </a:solidFill>
+                <a:miter lim="800000"/>
+                <a:headEnd/>
+                <a:tailEnd/>
+              </a14:hiddenLine>
+            </a:ext>
+          </a:extLst>
+        </p:spPr>
+      </p:pic>
     </p:spTree>
     <p:extLst>
       <p:ext uri="{BB962C8B-B14F-4D97-AF65-F5344CB8AC3E}">

</xml_diff>